<commit_message>
Presentation and write up aug 21 1018
</commit_message>
<xml_diff>
--- a/Presentation/LACity Crime-Final Slides.pptx
+++ b/Presentation/LACity Crime-Final Slides.pptx
@@ -4,6 +4,9 @@
   <p:sldMasterIdLst>
     <p:sldMasterId id="2147483684" r:id="rId1"/>
   </p:sldMasterIdLst>
+  <p:notesMasterIdLst>
+    <p:notesMasterId r:id="rId25"/>
+  </p:notesMasterIdLst>
   <p:sldIdLst>
     <p:sldId id="257" r:id="rId2"/>
     <p:sldId id="258" r:id="rId3"/>
@@ -11,9 +14,9 @@
     <p:sldId id="283" r:id="rId5"/>
     <p:sldId id="274" r:id="rId6"/>
     <p:sldId id="261" r:id="rId7"/>
-    <p:sldId id="285" r:id="rId8"/>
-    <p:sldId id="276" r:id="rId9"/>
-    <p:sldId id="286" r:id="rId10"/>
+    <p:sldId id="288" r:id="rId8"/>
+    <p:sldId id="285" r:id="rId9"/>
+    <p:sldId id="276" r:id="rId10"/>
     <p:sldId id="271" r:id="rId11"/>
     <p:sldId id="272" r:id="rId12"/>
     <p:sldId id="273" r:id="rId13"/>
@@ -134,6 +137,557 @@
 </p:presentation>
 </file>
 
+<file path=ppt/notesMasters/notesMaster1.xml><?xml version="1.0" encoding="utf-8"?>
+<p:notesMaster xmlns:a="http://schemas.openxmlformats.org/drawingml/2006/main" xmlns:r="http://schemas.openxmlformats.org/officeDocument/2006/relationships" xmlns:p="http://schemas.openxmlformats.org/presentationml/2006/main">
+  <p:cSld>
+    <p:bg>
+      <p:bgRef idx="1001">
+        <a:schemeClr val="bg1"/>
+      </p:bgRef>
+    </p:bg>
+    <p:spTree>
+      <p:nvGrpSpPr>
+        <p:cNvPr id="1" name=""/>
+        <p:cNvGrpSpPr/>
+        <p:nvPr/>
+      </p:nvGrpSpPr>
+      <p:grpSpPr>
+        <a:xfrm>
+          <a:off x="0" y="0"/>
+          <a:ext cx="0" cy="0"/>
+          <a:chOff x="0" y="0"/>
+          <a:chExt cx="0" cy="0"/>
+        </a:xfrm>
+      </p:grpSpPr>
+      <p:sp>
+        <p:nvSpPr>
+          <p:cNvPr id="2" name="Header Placeholder 1"/>
+          <p:cNvSpPr>
+            <a:spLocks noGrp="1"/>
+          </p:cNvSpPr>
+          <p:nvPr>
+            <p:ph type="hdr" sz="quarter"/>
+          </p:nvPr>
+        </p:nvSpPr>
+        <p:spPr>
+          <a:xfrm>
+            <a:off x="0" y="0"/>
+            <a:ext cx="2971800" cy="458788"/>
+          </a:xfrm>
+          <a:prstGeom prst="rect">
+            <a:avLst/>
+          </a:prstGeom>
+        </p:spPr>
+        <p:txBody>
+          <a:bodyPr vert="horz" lIns="91440" tIns="45720" rIns="91440" bIns="45720" rtlCol="0"/>
+          <a:lstStyle>
+            <a:lvl1pPr algn="l">
+              <a:defRPr sz="1200"/>
+            </a:lvl1pPr>
+          </a:lstStyle>
+          <a:p>
+            <a:endParaRPr lang="en-US"/>
+          </a:p>
+        </p:txBody>
+      </p:sp>
+      <p:sp>
+        <p:nvSpPr>
+          <p:cNvPr id="3" name="Date Placeholder 2"/>
+          <p:cNvSpPr>
+            <a:spLocks noGrp="1"/>
+          </p:cNvSpPr>
+          <p:nvPr>
+            <p:ph type="dt" idx="1"/>
+          </p:nvPr>
+        </p:nvSpPr>
+        <p:spPr>
+          <a:xfrm>
+            <a:off x="3884613" y="0"/>
+            <a:ext cx="2971800" cy="458788"/>
+          </a:xfrm>
+          <a:prstGeom prst="rect">
+            <a:avLst/>
+          </a:prstGeom>
+        </p:spPr>
+        <p:txBody>
+          <a:bodyPr vert="horz" lIns="91440" tIns="45720" rIns="91440" bIns="45720" rtlCol="0"/>
+          <a:lstStyle>
+            <a:lvl1pPr algn="r">
+              <a:defRPr sz="1200"/>
+            </a:lvl1pPr>
+          </a:lstStyle>
+          <a:p>
+            <a:fld id="{89D7179B-443D-5249-9575-0154B1136CED}" type="datetimeFigureOut">
+              <a:rPr lang="en-US" smtClean="0"/>
+              <a:t>8/21/18</a:t>
+            </a:fld>
+            <a:endParaRPr lang="en-US"/>
+          </a:p>
+        </p:txBody>
+      </p:sp>
+      <p:sp>
+        <p:nvSpPr>
+          <p:cNvPr id="4" name="Slide Image Placeholder 3"/>
+          <p:cNvSpPr>
+            <a:spLocks noGrp="1" noRot="1" noChangeAspect="1"/>
+          </p:cNvSpPr>
+          <p:nvPr>
+            <p:ph type="sldImg" idx="2"/>
+          </p:nvPr>
+        </p:nvSpPr>
+        <p:spPr>
+          <a:xfrm>
+            <a:off x="685800" y="1143000"/>
+            <a:ext cx="5486400" cy="3086100"/>
+          </a:xfrm>
+          <a:prstGeom prst="rect">
+            <a:avLst/>
+          </a:prstGeom>
+          <a:noFill/>
+          <a:ln w="12700">
+            <a:solidFill>
+              <a:prstClr val="black"/>
+            </a:solidFill>
+          </a:ln>
+        </p:spPr>
+        <p:txBody>
+          <a:bodyPr vert="horz" lIns="91440" tIns="45720" rIns="91440" bIns="45720" rtlCol="0" anchor="ctr"/>
+          <a:lstStyle/>
+          <a:p>
+            <a:endParaRPr lang="en-US"/>
+          </a:p>
+        </p:txBody>
+      </p:sp>
+      <p:sp>
+        <p:nvSpPr>
+          <p:cNvPr id="5" name="Notes Placeholder 4"/>
+          <p:cNvSpPr>
+            <a:spLocks noGrp="1"/>
+          </p:cNvSpPr>
+          <p:nvPr>
+            <p:ph type="body" sz="quarter" idx="3"/>
+          </p:nvPr>
+        </p:nvSpPr>
+        <p:spPr>
+          <a:xfrm>
+            <a:off x="685800" y="4400550"/>
+            <a:ext cx="5486400" cy="3600450"/>
+          </a:xfrm>
+          <a:prstGeom prst="rect">
+            <a:avLst/>
+          </a:prstGeom>
+        </p:spPr>
+        <p:txBody>
+          <a:bodyPr vert="horz" lIns="91440" tIns="45720" rIns="91440" bIns="45720" rtlCol="0"/>
+          <a:lstStyle/>
+          <a:p>
+            <a:pPr lvl="0"/>
+            <a:r>
+              <a:rPr lang="en-US"/>
+              <a:t>Edit Master text styles</a:t>
+            </a:r>
+          </a:p>
+          <a:p>
+            <a:pPr lvl="1"/>
+            <a:r>
+              <a:rPr lang="en-US"/>
+              <a:t>Second level</a:t>
+            </a:r>
+          </a:p>
+          <a:p>
+            <a:pPr lvl="2"/>
+            <a:r>
+              <a:rPr lang="en-US"/>
+              <a:t>Third level</a:t>
+            </a:r>
+          </a:p>
+          <a:p>
+            <a:pPr lvl="3"/>
+            <a:r>
+              <a:rPr lang="en-US"/>
+              <a:t>Fourth level</a:t>
+            </a:r>
+          </a:p>
+          <a:p>
+            <a:pPr lvl="4"/>
+            <a:r>
+              <a:rPr lang="en-US"/>
+              <a:t>Fifth level</a:t>
+            </a:r>
+          </a:p>
+        </p:txBody>
+      </p:sp>
+      <p:sp>
+        <p:nvSpPr>
+          <p:cNvPr id="6" name="Footer Placeholder 5"/>
+          <p:cNvSpPr>
+            <a:spLocks noGrp="1"/>
+          </p:cNvSpPr>
+          <p:nvPr>
+            <p:ph type="ftr" sz="quarter" idx="4"/>
+          </p:nvPr>
+        </p:nvSpPr>
+        <p:spPr>
+          <a:xfrm>
+            <a:off x="0" y="8685213"/>
+            <a:ext cx="2971800" cy="458787"/>
+          </a:xfrm>
+          <a:prstGeom prst="rect">
+            <a:avLst/>
+          </a:prstGeom>
+        </p:spPr>
+        <p:txBody>
+          <a:bodyPr vert="horz" lIns="91440" tIns="45720" rIns="91440" bIns="45720" rtlCol="0" anchor="b"/>
+          <a:lstStyle>
+            <a:lvl1pPr algn="l">
+              <a:defRPr sz="1200"/>
+            </a:lvl1pPr>
+          </a:lstStyle>
+          <a:p>
+            <a:endParaRPr lang="en-US"/>
+          </a:p>
+        </p:txBody>
+      </p:sp>
+      <p:sp>
+        <p:nvSpPr>
+          <p:cNvPr id="7" name="Slide Number Placeholder 6"/>
+          <p:cNvSpPr>
+            <a:spLocks noGrp="1"/>
+          </p:cNvSpPr>
+          <p:nvPr>
+            <p:ph type="sldNum" sz="quarter" idx="5"/>
+          </p:nvPr>
+        </p:nvSpPr>
+        <p:spPr>
+          <a:xfrm>
+            <a:off x="3884613" y="8685213"/>
+            <a:ext cx="2971800" cy="458787"/>
+          </a:xfrm>
+          <a:prstGeom prst="rect">
+            <a:avLst/>
+          </a:prstGeom>
+        </p:spPr>
+        <p:txBody>
+          <a:bodyPr vert="horz" lIns="91440" tIns="45720" rIns="91440" bIns="45720" rtlCol="0" anchor="b"/>
+          <a:lstStyle>
+            <a:lvl1pPr algn="r">
+              <a:defRPr sz="1200"/>
+            </a:lvl1pPr>
+          </a:lstStyle>
+          <a:p>
+            <a:fld id="{E023DEB2-733F-5C48-B474-D1DC0D26802D}" type="slidenum">
+              <a:rPr lang="en-US" smtClean="0"/>
+              <a:t>‹#›</a:t>
+            </a:fld>
+            <a:endParaRPr lang="en-US"/>
+          </a:p>
+        </p:txBody>
+      </p:sp>
+    </p:spTree>
+    <p:extLst>
+      <p:ext uri="{BB962C8B-B14F-4D97-AF65-F5344CB8AC3E}">
+        <p14:creationId xmlns:p14="http://schemas.microsoft.com/office/powerpoint/2010/main" val="1318492362"/>
+      </p:ext>
+    </p:extLst>
+  </p:cSld>
+  <p:clrMap bg1="lt1" tx1="dk1" bg2="lt2" tx2="dk2" accent1="accent1" accent2="accent2" accent3="accent3" accent4="accent4" accent5="accent5" accent6="accent6" hlink="hlink" folHlink="folHlink"/>
+  <p:notesStyle>
+    <a:lvl1pPr marL="0" algn="l" defTabSz="914400" rtl="0" eaLnBrk="1" latinLnBrk="0" hangingPunct="1">
+      <a:defRPr sz="1200" kern="1200">
+        <a:solidFill>
+          <a:schemeClr val="tx1"/>
+        </a:solidFill>
+        <a:latin typeface="+mn-lt"/>
+        <a:ea typeface="+mn-ea"/>
+        <a:cs typeface="+mn-cs"/>
+      </a:defRPr>
+    </a:lvl1pPr>
+    <a:lvl2pPr marL="457200" algn="l" defTabSz="914400" rtl="0" eaLnBrk="1" latinLnBrk="0" hangingPunct="1">
+      <a:defRPr sz="1200" kern="1200">
+        <a:solidFill>
+          <a:schemeClr val="tx1"/>
+        </a:solidFill>
+        <a:latin typeface="+mn-lt"/>
+        <a:ea typeface="+mn-ea"/>
+        <a:cs typeface="+mn-cs"/>
+      </a:defRPr>
+    </a:lvl2pPr>
+    <a:lvl3pPr marL="914400" algn="l" defTabSz="914400" rtl="0" eaLnBrk="1" latinLnBrk="0" hangingPunct="1">
+      <a:defRPr sz="1200" kern="1200">
+        <a:solidFill>
+          <a:schemeClr val="tx1"/>
+        </a:solidFill>
+        <a:latin typeface="+mn-lt"/>
+        <a:ea typeface="+mn-ea"/>
+        <a:cs typeface="+mn-cs"/>
+      </a:defRPr>
+    </a:lvl3pPr>
+    <a:lvl4pPr marL="1371600" algn="l" defTabSz="914400" rtl="0" eaLnBrk="1" latinLnBrk="0" hangingPunct="1">
+      <a:defRPr sz="1200" kern="1200">
+        <a:solidFill>
+          <a:schemeClr val="tx1"/>
+        </a:solidFill>
+        <a:latin typeface="+mn-lt"/>
+        <a:ea typeface="+mn-ea"/>
+        <a:cs typeface="+mn-cs"/>
+      </a:defRPr>
+    </a:lvl4pPr>
+    <a:lvl5pPr marL="1828800" algn="l" defTabSz="914400" rtl="0" eaLnBrk="1" latinLnBrk="0" hangingPunct="1">
+      <a:defRPr sz="1200" kern="1200">
+        <a:solidFill>
+          <a:schemeClr val="tx1"/>
+        </a:solidFill>
+        <a:latin typeface="+mn-lt"/>
+        <a:ea typeface="+mn-ea"/>
+        <a:cs typeface="+mn-cs"/>
+      </a:defRPr>
+    </a:lvl5pPr>
+    <a:lvl6pPr marL="2286000" algn="l" defTabSz="914400" rtl="0" eaLnBrk="1" latinLnBrk="0" hangingPunct="1">
+      <a:defRPr sz="1200" kern="1200">
+        <a:solidFill>
+          <a:schemeClr val="tx1"/>
+        </a:solidFill>
+        <a:latin typeface="+mn-lt"/>
+        <a:ea typeface="+mn-ea"/>
+        <a:cs typeface="+mn-cs"/>
+      </a:defRPr>
+    </a:lvl6pPr>
+    <a:lvl7pPr marL="2743200" algn="l" defTabSz="914400" rtl="0" eaLnBrk="1" latinLnBrk="0" hangingPunct="1">
+      <a:defRPr sz="1200" kern="1200">
+        <a:solidFill>
+          <a:schemeClr val="tx1"/>
+        </a:solidFill>
+        <a:latin typeface="+mn-lt"/>
+        <a:ea typeface="+mn-ea"/>
+        <a:cs typeface="+mn-cs"/>
+      </a:defRPr>
+    </a:lvl7pPr>
+    <a:lvl8pPr marL="3200400" algn="l" defTabSz="914400" rtl="0" eaLnBrk="1" latinLnBrk="0" hangingPunct="1">
+      <a:defRPr sz="1200" kern="1200">
+        <a:solidFill>
+          <a:schemeClr val="tx1"/>
+        </a:solidFill>
+        <a:latin typeface="+mn-lt"/>
+        <a:ea typeface="+mn-ea"/>
+        <a:cs typeface="+mn-cs"/>
+      </a:defRPr>
+    </a:lvl8pPr>
+    <a:lvl9pPr marL="3657600" algn="l" defTabSz="914400" rtl="0" eaLnBrk="1" latinLnBrk="0" hangingPunct="1">
+      <a:defRPr sz="1200" kern="1200">
+        <a:solidFill>
+          <a:schemeClr val="tx1"/>
+        </a:solidFill>
+        <a:latin typeface="+mn-lt"/>
+        <a:ea typeface="+mn-ea"/>
+        <a:cs typeface="+mn-cs"/>
+      </a:defRPr>
+    </a:lvl9pPr>
+  </p:notesStyle>
+</p:notesMaster>
+</file>
+
+<file path=ppt/notesSlides/notesSlide1.xml><?xml version="1.0" encoding="utf-8"?>
+<p:notes xmlns:a="http://schemas.openxmlformats.org/drawingml/2006/main" xmlns:r="http://schemas.openxmlformats.org/officeDocument/2006/relationships" xmlns:p="http://schemas.openxmlformats.org/presentationml/2006/main">
+  <p:cSld>
+    <p:spTree>
+      <p:nvGrpSpPr>
+        <p:cNvPr id="1" name=""/>
+        <p:cNvGrpSpPr/>
+        <p:nvPr/>
+      </p:nvGrpSpPr>
+      <p:grpSpPr>
+        <a:xfrm>
+          <a:off x="0" y="0"/>
+          <a:ext cx="0" cy="0"/>
+          <a:chOff x="0" y="0"/>
+          <a:chExt cx="0" cy="0"/>
+        </a:xfrm>
+      </p:grpSpPr>
+      <p:sp>
+        <p:nvSpPr>
+          <p:cNvPr id="2" name="Slide Image Placeholder 1"/>
+          <p:cNvSpPr>
+            <a:spLocks noGrp="1" noRot="1" noChangeAspect="1"/>
+          </p:cNvSpPr>
+          <p:nvPr>
+            <p:ph type="sldImg"/>
+          </p:nvPr>
+        </p:nvSpPr>
+        <p:spPr/>
+      </p:sp>
+      <p:sp>
+        <p:nvSpPr>
+          <p:cNvPr id="3" name="Notes Placeholder 2"/>
+          <p:cNvSpPr>
+            <a:spLocks noGrp="1"/>
+          </p:cNvSpPr>
+          <p:nvPr>
+            <p:ph type="body" idx="1"/>
+          </p:nvPr>
+        </p:nvSpPr>
+        <p:spPr/>
+        <p:txBody>
+          <a:bodyPr/>
+          <a:lstStyle/>
+          <a:p>
+            <a:r>
+              <a:rPr lang="en-US" dirty="0"/>
+              <a:t>For now hide it. It is just for reference.</a:t>
+            </a:r>
+          </a:p>
+        </p:txBody>
+      </p:sp>
+      <p:sp>
+        <p:nvSpPr>
+          <p:cNvPr id="4" name="Slide Number Placeholder 3"/>
+          <p:cNvSpPr>
+            <a:spLocks noGrp="1"/>
+          </p:cNvSpPr>
+          <p:nvPr>
+            <p:ph type="sldNum" sz="quarter" idx="5"/>
+          </p:nvPr>
+        </p:nvSpPr>
+        <p:spPr/>
+        <p:txBody>
+          <a:bodyPr/>
+          <a:lstStyle/>
+          <a:p>
+            <a:fld id="{E023DEB2-733F-5C48-B474-D1DC0D26802D}" type="slidenum">
+              <a:rPr lang="en-US" smtClean="0"/>
+              <a:t>2</a:t>
+            </a:fld>
+            <a:endParaRPr lang="en-US"/>
+          </a:p>
+        </p:txBody>
+      </p:sp>
+    </p:spTree>
+    <p:extLst>
+      <p:ext uri="{BB962C8B-B14F-4D97-AF65-F5344CB8AC3E}">
+        <p14:creationId xmlns:p14="http://schemas.microsoft.com/office/powerpoint/2010/main" val="1503955104"/>
+      </p:ext>
+    </p:extLst>
+  </p:cSld>
+  <p:clrMapOvr>
+    <a:masterClrMapping/>
+  </p:clrMapOvr>
+</p:notes>
+</file>
+
+<file path=ppt/notesSlides/notesSlide2.xml><?xml version="1.0" encoding="utf-8"?>
+<p:notes xmlns:a="http://schemas.openxmlformats.org/drawingml/2006/main" xmlns:r="http://schemas.openxmlformats.org/officeDocument/2006/relationships" xmlns:p="http://schemas.openxmlformats.org/presentationml/2006/main">
+  <p:cSld>
+    <p:spTree>
+      <p:nvGrpSpPr>
+        <p:cNvPr id="1" name=""/>
+        <p:cNvGrpSpPr/>
+        <p:nvPr/>
+      </p:nvGrpSpPr>
+      <p:grpSpPr>
+        <a:xfrm>
+          <a:off x="0" y="0"/>
+          <a:ext cx="0" cy="0"/>
+          <a:chOff x="0" y="0"/>
+          <a:chExt cx="0" cy="0"/>
+        </a:xfrm>
+      </p:grpSpPr>
+      <p:sp>
+        <p:nvSpPr>
+          <p:cNvPr id="2" name="Slide Image Placeholder 1"/>
+          <p:cNvSpPr>
+            <a:spLocks noGrp="1" noRot="1" noChangeAspect="1"/>
+          </p:cNvSpPr>
+          <p:nvPr>
+            <p:ph type="sldImg"/>
+          </p:nvPr>
+        </p:nvSpPr>
+        <p:spPr/>
+      </p:sp>
+      <p:sp>
+        <p:nvSpPr>
+          <p:cNvPr id="3" name="Notes Placeholder 2"/>
+          <p:cNvSpPr>
+            <a:spLocks noGrp="1"/>
+          </p:cNvSpPr>
+          <p:nvPr>
+            <p:ph type="body" idx="1"/>
+          </p:nvPr>
+        </p:nvSpPr>
+        <p:spPr/>
+        <p:txBody>
+          <a:bodyPr/>
+          <a:lstStyle/>
+          <a:p>
+            <a:pPr marL="0" marR="0" lvl="0" indent="0" algn="l" defTabSz="914400" rtl="0" eaLnBrk="1" fontAlgn="auto" latinLnBrk="0" hangingPunct="1">
+              <a:lnSpc>
+                <a:spcPct val="100000"/>
+              </a:lnSpc>
+              <a:spcBef>
+                <a:spcPts val="0"/>
+              </a:spcBef>
+              <a:spcAft>
+                <a:spcPts val="0"/>
+              </a:spcAft>
+              <a:buClrTx/>
+              <a:buSzTx/>
+              <a:buFontTx/>
+              <a:buNone/>
+              <a:tabLst/>
+              <a:defRPr/>
+            </a:pPr>
+            <a:r>
+              <a:rPr lang="en-US" sz="1200" b="1" i="0" kern="1200" dirty="0">
+                <a:solidFill>
+                  <a:schemeClr val="tx1"/>
+                </a:solidFill>
+                <a:effectLst/>
+                <a:latin typeface="+mn-lt"/>
+                <a:ea typeface="+mn-ea"/>
+                <a:cs typeface="+mn-cs"/>
+              </a:rPr>
+              <a:t>Note that among the 15 largest counties in CA, only Kern and Los Angeles saw both violent and property crime rates increase in 2016.</a:t>
+            </a:r>
+          </a:p>
+          <a:p>
+            <a:endParaRPr lang="en-US" dirty="0"/>
+          </a:p>
+        </p:txBody>
+      </p:sp>
+      <p:sp>
+        <p:nvSpPr>
+          <p:cNvPr id="4" name="Slide Number Placeholder 3"/>
+          <p:cNvSpPr>
+            <a:spLocks noGrp="1"/>
+          </p:cNvSpPr>
+          <p:nvPr>
+            <p:ph type="sldNum" sz="quarter" idx="5"/>
+          </p:nvPr>
+        </p:nvSpPr>
+        <p:spPr/>
+        <p:txBody>
+          <a:bodyPr/>
+          <a:lstStyle/>
+          <a:p>
+            <a:fld id="{E023DEB2-733F-5C48-B474-D1DC0D26802D}" type="slidenum">
+              <a:rPr lang="en-US" smtClean="0"/>
+              <a:t>3</a:t>
+            </a:fld>
+            <a:endParaRPr lang="en-US"/>
+          </a:p>
+        </p:txBody>
+      </p:sp>
+    </p:spTree>
+    <p:extLst>
+      <p:ext uri="{BB962C8B-B14F-4D97-AF65-F5344CB8AC3E}">
+        <p14:creationId xmlns:p14="http://schemas.microsoft.com/office/powerpoint/2010/main" val="1246311787"/>
+      </p:ext>
+    </p:extLst>
+  </p:cSld>
+  <p:clrMapOvr>
+    <a:masterClrMapping/>
+  </p:clrMapOvr>
+</p:notes>
+</file>
+
 <file path=ppt/slideLayouts/slideLayout1.xml><?xml version="1.0" encoding="utf-8"?>
 <p:sldLayout xmlns:a="http://schemas.openxmlformats.org/drawingml/2006/main" xmlns:r="http://schemas.openxmlformats.org/officeDocument/2006/relationships" xmlns:p="http://schemas.openxmlformats.org/presentationml/2006/main" type="title" preserve="1">
   <p:cSld name="Title Slide">
@@ -297,7 +851,7 @@
           <a:p>
             <a:fld id="{AB60B2D9-5BB2-0E43-9C83-52819BF7F2F6}" type="datetimeFigureOut">
               <a:rPr lang="en-US" smtClean="0"/>
-              <a:t>8/18/18</a:t>
+              <a:t>8/21/18</a:t>
             </a:fld>
             <a:endParaRPr lang="en-US"/>
           </a:p>
@@ -467,7 +1021,7 @@
           <a:p>
             <a:fld id="{AB60B2D9-5BB2-0E43-9C83-52819BF7F2F6}" type="datetimeFigureOut">
               <a:rPr lang="en-US" smtClean="0"/>
-              <a:t>8/18/18</a:t>
+              <a:t>8/21/18</a:t>
             </a:fld>
             <a:endParaRPr lang="en-US"/>
           </a:p>
@@ -647,7 +1201,7 @@
           <a:p>
             <a:fld id="{AB60B2D9-5BB2-0E43-9C83-52819BF7F2F6}" type="datetimeFigureOut">
               <a:rPr lang="en-US" smtClean="0"/>
-              <a:t>8/18/18</a:t>
+              <a:t>8/21/18</a:t>
             </a:fld>
             <a:endParaRPr lang="en-US"/>
           </a:p>
@@ -817,7 +1371,7 @@
           <a:p>
             <a:fld id="{AB60B2D9-5BB2-0E43-9C83-52819BF7F2F6}" type="datetimeFigureOut">
               <a:rPr lang="en-US" smtClean="0"/>
-              <a:t>8/18/18</a:t>
+              <a:t>8/21/18</a:t>
             </a:fld>
             <a:endParaRPr lang="en-US"/>
           </a:p>
@@ -1085,7 +1639,7 @@
           <a:p>
             <a:fld id="{AB60B2D9-5BB2-0E43-9C83-52819BF7F2F6}" type="datetimeFigureOut">
               <a:rPr lang="en-US" smtClean="0"/>
-              <a:t>8/18/18</a:t>
+              <a:t>8/21/18</a:t>
             </a:fld>
             <a:endParaRPr lang="en-US"/>
           </a:p>
@@ -1317,7 +1871,7 @@
           <a:p>
             <a:fld id="{AB60B2D9-5BB2-0E43-9C83-52819BF7F2F6}" type="datetimeFigureOut">
               <a:rPr lang="en-US" smtClean="0"/>
-              <a:t>8/18/18</a:t>
+              <a:t>8/21/18</a:t>
             </a:fld>
             <a:endParaRPr lang="en-US"/>
           </a:p>
@@ -1672,7 +2226,7 @@
           <a:p>
             <a:fld id="{AB60B2D9-5BB2-0E43-9C83-52819BF7F2F6}" type="datetimeFigureOut">
               <a:rPr lang="en-US" smtClean="0"/>
-              <a:t>8/18/18</a:t>
+              <a:t>8/21/18</a:t>
             </a:fld>
             <a:endParaRPr lang="en-US"/>
           </a:p>
@@ -1813,7 +2367,7 @@
           <a:p>
             <a:fld id="{AB60B2D9-5BB2-0E43-9C83-52819BF7F2F6}" type="datetimeFigureOut">
               <a:rPr lang="en-US" smtClean="0"/>
-              <a:t>8/18/18</a:t>
+              <a:t>8/21/18</a:t>
             </a:fld>
             <a:endParaRPr lang="en-US"/>
           </a:p>
@@ -1908,7 +2462,7 @@
           <a:p>
             <a:fld id="{AB60B2D9-5BB2-0E43-9C83-52819BF7F2F6}" type="datetimeFigureOut">
               <a:rPr lang="en-US" smtClean="0"/>
-              <a:t>8/18/18</a:t>
+              <a:t>8/21/18</a:t>
             </a:fld>
             <a:endParaRPr lang="en-US"/>
           </a:p>
@@ -2265,7 +2819,7 @@
           <a:p>
             <a:fld id="{AB60B2D9-5BB2-0E43-9C83-52819BF7F2F6}" type="datetimeFigureOut">
               <a:rPr lang="en-US" smtClean="0"/>
-              <a:t>8/18/18</a:t>
+              <a:t>8/21/18</a:t>
             </a:fld>
             <a:endParaRPr lang="en-US"/>
           </a:p>
@@ -2621,7 +3175,7 @@
           <a:p>
             <a:fld id="{AB60B2D9-5BB2-0E43-9C83-52819BF7F2F6}" type="datetimeFigureOut">
               <a:rPr lang="en-US" smtClean="0"/>
-              <a:t>8/18/18</a:t>
+              <a:t>8/21/18</a:t>
             </a:fld>
             <a:endParaRPr lang="en-US"/>
           </a:p>
@@ -2860,7 +3414,7 @@
           <a:p>
             <a:fld id="{AB60B2D9-5BB2-0E43-9C83-52819BF7F2F6}" type="datetimeFigureOut">
               <a:rPr lang="en-US" smtClean="0"/>
-              <a:t>8/18/18</a:t>
+              <a:t>8/21/18</a:t>
             </a:fld>
             <a:endParaRPr lang="en-US"/>
           </a:p>
@@ -3354,7 +3908,7 @@
             <a:pPr algn="l"/>
             <a:r>
               <a:rPr lang="en-US" b="1" dirty="0"/>
-              <a:t>Analysis of Violent Crime Trends in Los Angeles, CA (2010 – 2017)</a:t>
+              <a:t>Analysis of Violent Crime in Los Angeles, CA (2010 – 2017)</a:t>
             </a:r>
           </a:p>
         </p:txBody>
@@ -3736,7 +4290,7 @@
         </p:nvSpPr>
         <p:spPr>
           <a:xfrm>
-            <a:off x="3373884" y="295704"/>
+            <a:off x="3406934" y="545692"/>
             <a:ext cx="4805798" cy="682492"/>
           </a:xfrm>
         </p:spPr>
@@ -3748,7 +4302,7 @@
           <a:p>
             <a:r>
               <a:rPr lang="en-US" dirty="0"/>
-              <a:t>Data description</a:t>
+              <a:t>3. description</a:t>
             </a:r>
           </a:p>
         </p:txBody>
@@ -3771,8 +4325,8 @@
         </p:nvSpPr>
         <p:spPr>
           <a:xfrm>
-            <a:off x="654907" y="1624791"/>
-            <a:ext cx="10243753" cy="4430021"/>
+            <a:off x="1018463" y="1933264"/>
+            <a:ext cx="10243753" cy="2770939"/>
           </a:xfrm>
         </p:spPr>
         <p:txBody>
@@ -3787,7 +4341,7 @@
               </a:lnSpc>
             </a:pPr>
             <a:r>
-              <a:rPr lang="en-US" sz="3200" dirty="0"/>
+              <a:rPr lang="en-US" sz="3600" dirty="0"/>
               <a:t>Number of observations (raw dataset) : 1,800,985</a:t>
             </a:r>
           </a:p>
@@ -3798,16 +4352,8 @@
               </a:lnSpc>
             </a:pPr>
             <a:r>
-              <a:rPr lang="en-US" sz="3200" dirty="0"/>
-              <a:t>Number of observations (after cleanup) : </a:t>
-            </a:r>
-            <a:r>
-              <a:rPr lang="en-US" sz="3200" dirty="0">
-                <a:solidFill>
-                  <a:srgbClr val="FF0000"/>
-                </a:solidFill>
-              </a:rPr>
-              <a:t>????</a:t>
+              <a:rPr lang="en-US" sz="3600" dirty="0"/>
+              <a:t>Years (raw dataset) : 2010 to 2018 (August)</a:t>
             </a:r>
           </a:p>
           <a:p>
@@ -3817,18 +4363,7 @@
               </a:lnSpc>
             </a:pPr>
             <a:r>
-              <a:rPr lang="en-US" sz="3200" dirty="0"/>
-              <a:t>Years (raw dataset) : 2010 to 2018 (August)</a:t>
-            </a:r>
-          </a:p>
-          <a:p>
-            <a:pPr>
-              <a:lnSpc>
-                <a:spcPct val="150000"/>
-              </a:lnSpc>
-            </a:pPr>
-            <a:r>
-              <a:rPr lang="en-US" sz="3200" dirty="0"/>
+              <a:rPr lang="en-US" sz="3600" dirty="0"/>
               <a:t>Years (included in our analysis): 2010 to 2017</a:t>
             </a:r>
           </a:p>
@@ -3893,22 +4428,28 @@
         <p:spPr>
           <a:xfrm>
             <a:off x="1484416" y="223286"/>
-            <a:ext cx="8476448" cy="1188720"/>
-          </a:xfrm>
-        </p:spPr>
-        <p:txBody>
-          <a:bodyPr/>
+            <a:ext cx="8476448" cy="944502"/>
+          </a:xfrm>
+        </p:spPr>
+        <p:txBody>
+          <a:bodyPr>
+            <a:normAutofit fontScale="90000"/>
+          </a:bodyPr>
           <a:lstStyle/>
           <a:p>
             <a:r>
               <a:rPr lang="en-US" dirty="0"/>
-              <a:t>Data Description:</a:t>
+              <a:t>3. Data Description</a:t>
             </a:r>
             <a:br>
               <a:rPr lang="en-US" dirty="0"/>
             </a:br>
             <a:r>
-              <a:rPr lang="en-US" dirty="0"/>
+              <a:rPr lang="en-US" dirty="0">
+                <a:solidFill>
+                  <a:srgbClr val="132BC0"/>
+                </a:solidFill>
+              </a:rPr>
               <a:t>Classification of crime</a:t>
             </a:r>
           </a:p>
@@ -3932,8 +4473,8 @@
         </p:nvSpPr>
         <p:spPr>
           <a:xfrm>
-            <a:off x="914399" y="1581664"/>
-            <a:ext cx="10663881" cy="4547287"/>
+            <a:off x="1608461" y="1424362"/>
+            <a:ext cx="8196551" cy="4716945"/>
           </a:xfrm>
         </p:spPr>
         <p:txBody>
@@ -4116,63 +4657,22 @@
         </p:nvSpPr>
         <p:spPr>
           <a:xfrm>
-            <a:off x="1613298" y="173859"/>
-            <a:ext cx="7729728" cy="1188720"/>
-          </a:xfrm>
-        </p:spPr>
-        <p:txBody>
-          <a:bodyPr/>
-          <a:lstStyle/>
-          <a:p>
-            <a:r>
-              <a:rPr lang="en-US" dirty="0"/>
-              <a:t>Data Description: </a:t>
-            </a:r>
-            <a:br>
-              <a:rPr lang="en-US" dirty="0"/>
-            </a:br>
+            <a:off x="2203375" y="173859"/>
+            <a:ext cx="7315200" cy="564271"/>
+          </a:xfrm>
+          <a:solidFill>
+            <a:srgbClr val="FFFF00"/>
+          </a:solidFill>
+        </p:spPr>
+        <p:txBody>
+          <a:bodyPr>
+            <a:normAutofit fontScale="90000"/>
+          </a:bodyPr>
+          <a:lstStyle/>
+          <a:p>
             <a:r>
               <a:rPr lang="en-US" dirty="0"/>
               <a:t>Violent Crime in LA City</a:t>
-            </a:r>
-          </a:p>
-        </p:txBody>
-      </p:sp>
-      <p:sp>
-        <p:nvSpPr>
-          <p:cNvPr id="6" name="TextBox 5">
-            <a:extLst>
-              <a:ext uri="{FF2B5EF4-FFF2-40B4-BE49-F238E27FC236}">
-                <a16:creationId xmlns:a16="http://schemas.microsoft.com/office/drawing/2014/main" id="{9B038051-36FC-0244-8A55-C66113CDDD9D}"/>
-              </a:ext>
-            </a:extLst>
-          </p:cNvPr>
-          <p:cNvSpPr txBox="1"/>
-          <p:nvPr/>
-        </p:nvSpPr>
-        <p:spPr>
-          <a:xfrm>
-            <a:off x="9700054" y="173859"/>
-            <a:ext cx="1902941" cy="1200329"/>
-          </a:xfrm>
-          <a:prstGeom prst="rect">
-            <a:avLst/>
-          </a:prstGeom>
-          <a:noFill/>
-        </p:spPr>
-        <p:txBody>
-          <a:bodyPr wrap="square" rtlCol="0">
-            <a:spAutoFit/>
-          </a:bodyPr>
-          <a:lstStyle/>
-          <a:p>
-            <a:r>
-              <a:rPr lang="en-US" sz="2400" b="1" dirty="0">
-                <a:solidFill>
-                  <a:srgbClr val="FF0000"/>
-                </a:solidFill>
-              </a:rPr>
-              <a:t>Need to clean this one!!!</a:t>
             </a:r>
           </a:p>
         </p:txBody>
@@ -4191,8 +4691,8 @@
         </p:nvSpPr>
         <p:spPr>
           <a:xfrm>
-            <a:off x="977333" y="1660291"/>
-            <a:ext cx="10317892" cy="4524315"/>
+            <a:off x="823098" y="837283"/>
+            <a:ext cx="10436142" cy="5632311"/>
           </a:xfrm>
           <a:prstGeom prst="rect">
             <a:avLst/>
@@ -4204,9 +4704,10 @@
           </a:bodyPr>
           <a:lstStyle/>
           <a:p>
-            <a:r>
-              <a:rPr lang="en-US" sz="1600" dirty="0"/>
-              <a:t>"BATTERY - SIMPLE ASSAULT", "ASSAULT WITH DEADLY WEAPON, AGGRAVATED ASSAULT", "ROBBERY", "THEFT PERSON","INTIMATE PARTNER - AGGRAVATED ASSAULT", "BURGLARY, ATTEMPTED", "BATTERY WITH SEXUAL CONTACT", "RAPE, FORCIBLE", "CHILD ABUSE (PHYSICAL) - SIMPLE ASSAULT", "CRM AGNST CHLD (13 OR UNTER) (14-15 &amp; SUSP 10 YRS OLDER)0060", "CHILD NEGLECT (SEE 300 W.I.C.)", "BATTERY POLICE (SIMPLE)", "SEX, UNLAWFUL", "DISCHARGE FIREARMS/SHOTS FIRED", "ARSON","OTHER ASSAULT", "CRIMINAL HOMICIDE", "SHOTS FIRED AT INHABITED DWELLING", "EXTORTION", "KIDNAPPING", "ORAL COPULATION", "SEXUAL PENETRATION WITH A FOREIGN OBJECT", "CHILD ABUSE (PHYSICAL) - AGGRAVATED ASSAULT", "ASSAULT WITH DEADLY WEAPON ON POLICE OFFICER", "THROWING OBJECT AT MOVING VEHICLE", "LEWD CONDUCT", "SODOMY/SECUAL CONTACT B/W PENIS OF ONE PERS TO ANUS OTH 0007=02", "CHILD STEALING", "RAPE, ATTEMPTED", "FALSE IMPRISONMENT", "KIDNAPPING - GRAND ATTEMPT", "SEXUAL PENETRATION W/FOREIGN OBJECT", "PIMPING", "CRIM AGNST CHLD (13 OR UNDER) (14-15 &amp; SUSP 10 YRS OLDER)", "SEX,UNLAWFUL(INC MUTUAL CONSENT, PENETRATION W/ FRGN OBJ0059", "BATTERY ON A FIREFIGHTER", "THEFT FROM PERSON - ATTEMPT", "SHOTS FIRED AT MOVING VEHICLE, TRAIN OR AIRCRAFT", "SEX,UNLAWFUL(INC MUTUAL CONSENT, PENETRATION W/ FRGN OBJ", "HUMAN TRAFFICKING - COMMERCIAL SEX ACTS", "SODOMY/SEXUAL CONTACT B/W PENIS OF ONE PERS TO ANUS OTH", "LEWD/LASCIVIOUS ACTS WITH CHILD", "CHILD PORNOGRAPHY", "LYNCHING", "DRUGS, TO A MINOR", "HUMAN TRAFFICKING - INVOLUNTARY SERVITUDE", "LYNCHING - ATTEMPTED", "INCITING A RIOT", "INCEST (SEXUAL ACTS BETWEEN BLOOD RELATIVES)", "ABORTION/ILLEGAL", "MANSLAUGHTER, NEGLIGENT", "TRAIN WRECKING"]</a:t>
+            <a:pPr algn="just"/>
+            <a:r>
+              <a:rPr lang="en-US" dirty="0"/>
+              <a:t>"BATTERY - SIMPLE ASSAULT", "ASSAULT WITH DEADLY WEAPON, AGGRAVATED ASSAULT", "ROBBERY", "THEFT PERSON","INTIMATE PARTNER - AGGRAVATED ASSAULT", "BURGLARY, ATTEMPTED", "BATTERY WITH SEXUAL CONTACT", "RAPE, FORCIBLE", "CHILD ABUSE (PHYSICAL) - SIMPLE ASSAULT", "CRM AGNST CHLD (13 OR UNTER) (14-15 &amp; SUSP 10 YRS OLDER)0060", "CHILD NEGLECT", "BATTERY POLICE (SIMPLE)", "SEX, UNLAWFUL", "DISCHARGE FIREARMS/SHOTS FIRED", "ARSON","OTHER ASSAULT", "CRIMINAL HOMICIDE", "SHOTS FIRED AT INHABITED DWELLING", "EXTORTION", "KIDNAPPING", "ORAL COPULATION", "SEXUAL PENETRATION WITH A FOREIGN OBJECT", "CHILD ABUSE (PHYSICAL) - AGGRAVATED ASSAULT", "ASSAULT WITH DEADLY WEAPON ON POLICE OFFICER", "THROWING OBJECT AT MOVING VEHICLE", "LEWD CONDUCT", "SODOMY/SECUAL CONTACT B/W PENIS OF ONE PERS TO ANUS OTH 0007=02", "CHILD STEALING", "RAPE, ATTEMPTED", "FALSE IMPRISONMENT", "KIDNAPPING - GRAND ATTEMPT", "SEXUAL PENETRATION W/FOREIGN OBJECT", "PIMPING", "CRIM AGNST CHLD (13 OR UNDER) (14-15 &amp; SUSP 10 YRS OLDER)", "SEX,UNLAWFUL(INC MUTUAL CONSENT, PENETRATION W/ FRGN OBJ0059", "BATTERY ON A FIREFIGHTER", "THEFT FROM PERSON - ATTEMPT", "SHOTS FIRED AT MOVING VEHICLE, TRAIN OR AIRCRAFT", "SEX,UNLAWFUL(INC MUTUAL CONSENT, PENETRATION W/ FRGN OBJ", "HUMAN TRAFFICKING - COMMERCIAL SEX ACTS", "SODOMY/SEXUAL CONTACT B/W PENIS OF ONE PERS TO ANUS OTH", "LEWD/LASCIVIOUS ACTS WITH CHILD", "CHILD PORNOGRAPHY", "LYNCHING", "DRUGS, TO A MINOR", "HUMAN TRAFFICKING - INVOLUNTARY SERVITUDE", "LYNCHING - ATTEMPTED", "INCITING A RIOT", "INCEST (SEXUAL ACTS BETWEEN BLOOD RELATIVES)", "ABORTION/ILLEGAL", "MANSLAUGHTER, NEGLIGENT", "TRAIN WRECKING"]</a:t>
             </a:r>
           </a:p>
         </p:txBody>
@@ -4269,8 +4770,8 @@
         </p:nvSpPr>
         <p:spPr>
           <a:xfrm>
-            <a:off x="261882" y="105474"/>
-            <a:ext cx="4841459" cy="759498"/>
+            <a:off x="393962" y="77118"/>
+            <a:ext cx="6601749" cy="749147"/>
           </a:xfrm>
         </p:spPr>
         <p:txBody>
@@ -4279,6 +4780,13 @@
           </a:bodyPr>
           <a:lstStyle/>
           <a:p>
+            <a:r>
+              <a:rPr lang="en-US" dirty="0"/>
+              <a:t>3. Description</a:t>
+            </a:r>
+            <a:br>
+              <a:rPr lang="en-US" dirty="0"/>
+            </a:br>
             <a:r>
               <a:rPr lang="en-US" dirty="0"/>
               <a:t>Trends from our data</a:t>
@@ -4329,8 +4837,8 @@
         </p:nvSpPr>
         <p:spPr>
           <a:xfrm>
-            <a:off x="8019535" y="345989"/>
-            <a:ext cx="3620530" cy="1200329"/>
+            <a:off x="8964707" y="2340042"/>
+            <a:ext cx="2675358" cy="1754326"/>
           </a:xfrm>
           <a:prstGeom prst="rect">
             <a:avLst/>
@@ -4422,7 +4930,7 @@
         </p:nvSpPr>
         <p:spPr>
           <a:xfrm>
-            <a:off x="261882" y="105474"/>
+            <a:off x="2905930" y="314794"/>
             <a:ext cx="4841459" cy="759498"/>
           </a:xfrm>
         </p:spPr>
@@ -4432,6 +4940,13 @@
           </a:bodyPr>
           <a:lstStyle/>
           <a:p>
+            <a:r>
+              <a:rPr lang="en-US" dirty="0"/>
+              <a:t>3. Description</a:t>
+            </a:r>
+            <a:br>
+              <a:rPr lang="en-US" dirty="0"/>
+            </a:br>
             <a:r>
               <a:rPr lang="en-US" dirty="0"/>
               <a:t>Trends from our data</a:t>
@@ -4463,8 +4978,8 @@
         </p:blipFill>
         <p:spPr>
           <a:xfrm>
-            <a:off x="261883" y="1185892"/>
-            <a:ext cx="7512687" cy="4332406"/>
+            <a:off x="1738144" y="1168022"/>
+            <a:ext cx="8940266" cy="5155660"/>
           </a:xfrm>
           <a:prstGeom prst="rect">
             <a:avLst/>
@@ -4529,7 +5044,7 @@
         </p:nvSpPr>
         <p:spPr>
           <a:xfrm>
-            <a:off x="261882" y="435085"/>
+            <a:off x="3886430" y="578304"/>
             <a:ext cx="4841459" cy="759498"/>
           </a:xfrm>
         </p:spPr>
@@ -4539,6 +5054,13 @@
           </a:bodyPr>
           <a:lstStyle/>
           <a:p>
+            <a:r>
+              <a:rPr lang="en-US" dirty="0"/>
+              <a:t>3. Description</a:t>
+            </a:r>
+            <a:br>
+              <a:rPr lang="en-US" dirty="0"/>
+            </a:br>
             <a:r>
               <a:rPr lang="en-US" dirty="0"/>
               <a:t>Trends from our data</a:t>
@@ -4568,8 +5090,8 @@
         </p:blipFill>
         <p:spPr>
           <a:xfrm>
-            <a:off x="261882" y="1502926"/>
-            <a:ext cx="6320118" cy="4213412"/>
+            <a:off x="2060154" y="1498294"/>
+            <a:ext cx="8328751" cy="4935557"/>
           </a:xfrm>
           <a:prstGeom prst="rect">
             <a:avLst/>
@@ -5521,12 +6043,14 @@
         </p:nvSpPr>
         <p:spPr>
           <a:xfrm>
-            <a:off x="1343232" y="290477"/>
-            <a:ext cx="9765964" cy="1280890"/>
-          </a:xfrm>
-        </p:spPr>
-        <p:txBody>
-          <a:bodyPr/>
+            <a:off x="3062690" y="462709"/>
+            <a:ext cx="5877760" cy="903384"/>
+          </a:xfrm>
+        </p:spPr>
+        <p:txBody>
+          <a:bodyPr>
+            <a:normAutofit/>
+          </a:bodyPr>
           <a:lstStyle/>
           <a:p>
             <a:r>
@@ -5535,7 +6059,7 @@
                   <a:schemeClr val="tx1"/>
                 </a:solidFill>
               </a:rPr>
-              <a:t>Future Work/Assignments</a:t>
+              <a:t>Future Work</a:t>
             </a:r>
           </a:p>
         </p:txBody>
@@ -5558,37 +6082,75 @@
         </p:nvSpPr>
         <p:spPr>
           <a:xfrm>
-            <a:off x="1249251" y="1705233"/>
-            <a:ext cx="10255361" cy="4205990"/>
-          </a:xfrm>
-        </p:spPr>
-        <p:txBody>
-          <a:bodyPr/>
+            <a:off x="826265" y="1927952"/>
+            <a:ext cx="10598227" cy="2996587"/>
+          </a:xfrm>
+        </p:spPr>
+        <p:txBody>
+          <a:bodyPr>
+            <a:normAutofit lnSpcReduction="10000"/>
+          </a:bodyPr>
           <a:lstStyle/>
           <a:p>
             <a:pPr algn="just"/>
             <a:r>
-              <a:rPr lang="en-US" dirty="0"/>
-              <a:t>1. … but property crime decreased in most counties. </a:t>
+              <a:rPr lang="en-US" sz="3200" dirty="0"/>
+              <a:t>One of the trends that we did not explore was: </a:t>
+            </a:r>
+          </a:p>
+          <a:p>
+            <a:pPr lvl="1" algn="just"/>
+            <a:r>
+              <a:rPr lang="en-US" sz="3200" dirty="0"/>
+              <a:t>“… but property crime decreased in most counties.” </a:t>
+            </a:r>
+          </a:p>
+          <a:p>
+            <a:pPr lvl="1" algn="just"/>
+            <a:r>
+              <a:rPr lang="en-US" sz="3200" dirty="0"/>
+              <a:t>Expand our analysis on property crime. </a:t>
             </a:r>
           </a:p>
           <a:p>
             <a:pPr algn="just"/>
             <a:r>
-              <a:rPr lang="en-US" dirty="0"/>
-              <a:t>2. </a:t>
+              <a:rPr lang="en-US" sz="3200" dirty="0"/>
+              <a:t>Work on the regressions. Multivariate regressions. </a:t>
             </a:r>
           </a:p>
           <a:p>
             <a:pPr algn="just"/>
             <a:r>
-              <a:rPr lang="en-US" dirty="0"/>
-              <a:t>3. </a:t>
+              <a:rPr lang="en-US" sz="3200" dirty="0"/>
+              <a:t>Create more interactive maps </a:t>
+            </a:r>
+            <a:r>
+              <a:rPr lang="en-US" sz="3200" dirty="0">
+                <a:sym typeface="Wingdings" pitchFamily="2" charset="2"/>
+              </a:rPr>
+              <a:t> </a:t>
+            </a:r>
+            <a:r>
+              <a:rPr lang="en-US" sz="3200" dirty="0"/>
+              <a:t>Choropleth maps</a:t>
             </a:r>
           </a:p>
           <a:p>
             <a:pPr algn="just"/>
-            <a:endParaRPr lang="en-US" dirty="0"/>
+            <a:endParaRPr lang="en-US" sz="3200" dirty="0"/>
+          </a:p>
+          <a:p>
+            <a:pPr algn="just"/>
+            <a:endParaRPr lang="en-US" sz="3200" dirty="0"/>
+          </a:p>
+          <a:p>
+            <a:pPr algn="just"/>
+            <a:endParaRPr lang="en-US" sz="3200" dirty="0"/>
+          </a:p>
+          <a:p>
+            <a:pPr algn="just"/>
+            <a:endParaRPr lang="en-US" sz="3200" dirty="0"/>
           </a:p>
         </p:txBody>
       </p:sp>
@@ -5648,14 +6210,21 @@
             <p:ph type="title"/>
           </p:nvPr>
         </p:nvSpPr>
-        <p:spPr/>
-        <p:txBody>
-          <a:bodyPr/>
+        <p:spPr>
+          <a:xfrm>
+            <a:off x="3344894" y="370336"/>
+            <a:ext cx="4841567" cy="444912"/>
+          </a:xfrm>
+        </p:spPr>
+        <p:txBody>
+          <a:bodyPr>
+            <a:normAutofit fontScale="90000"/>
+          </a:bodyPr>
           <a:lstStyle/>
           <a:p>
             <a:r>
               <a:rPr lang="en-US" dirty="0"/>
-              <a:t>References</a:t>
+              <a:t>Citations</a:t>
             </a:r>
           </a:p>
         </p:txBody>
@@ -5678,26 +6247,44 @@
         </p:nvSpPr>
         <p:spPr>
           <a:xfrm>
-            <a:off x="2231136" y="2153412"/>
-            <a:ext cx="7729728" cy="3586615"/>
-          </a:xfrm>
-        </p:spPr>
-        <p:txBody>
-          <a:bodyPr/>
-          <a:lstStyle/>
-          <a:p>
-            <a:r>
-              <a:rPr lang="en-US" dirty="0"/>
-              <a:t>1. https://</a:t>
-            </a:r>
-            <a:r>
-              <a:rPr lang="en-US" dirty="0" err="1"/>
-              <a:t>blog.dominodatalab.com</a:t>
-            </a:r>
-            <a:r>
-              <a:rPr lang="en-US" dirty="0"/>
-              <a:t>/creating-interactive-crime-maps-with-folium/</a:t>
-            </a:r>
+            <a:off x="837282" y="1024569"/>
+            <a:ext cx="10950766" cy="3808692"/>
+          </a:xfrm>
+        </p:spPr>
+        <p:txBody>
+          <a:bodyPr>
+            <a:normAutofit/>
+          </a:bodyPr>
+          <a:lstStyle/>
+          <a:p>
+            <a:r>
+              <a:rPr lang="en-US" sz="2400" dirty="0">
+                <a:hlinkClick r:id="rId2"/>
+              </a:rPr>
+              <a:t>https://blog.dominodatalab.com/creating-interactive-crime-maps-with-folium/</a:t>
+            </a:r>
+            <a:endParaRPr lang="en-US" sz="2400" dirty="0"/>
+          </a:p>
+          <a:p>
+            <a:r>
+              <a:rPr lang="en-US" sz="2400" dirty="0"/>
+              <a:t>U.S. Census Bureau (2016). </a:t>
+            </a:r>
+            <a:r>
+              <a:rPr lang="en-US" sz="2400" i="1" dirty="0"/>
+              <a:t>American Community Survey 1-year estimates.</a:t>
+            </a:r>
+            <a:r>
+              <a:rPr lang="en-US" sz="2400" dirty="0"/>
+              <a:t> Retrieved from </a:t>
+            </a:r>
+            <a:r>
+              <a:rPr lang="en-US" sz="2400" i="1" dirty="0"/>
+              <a:t>Census Reporter Profile page for Los Angeles, CA.</a:t>
+            </a:r>
+          </a:p>
+          <a:p>
+            <a:endParaRPr lang="en-US" sz="2400" dirty="0"/>
           </a:p>
         </p:txBody>
       </p:sp>
@@ -5715,8 +6302,8 @@
         </p:nvSpPr>
         <p:spPr>
           <a:xfrm>
-            <a:off x="3427881" y="5903309"/>
-            <a:ext cx="4036174" cy="461665"/>
+            <a:off x="3445836" y="6233342"/>
+            <a:ext cx="4360285" cy="461665"/>
           </a:xfrm>
           <a:prstGeom prst="rect">
             <a:avLst/>
@@ -5730,8 +6317,85 @@
           <a:lstStyle/>
           <a:p>
             <a:r>
-              <a:rPr lang="en-US" sz="2400" dirty="0"/>
-              <a:t>Thanks to Jake and Chris!</a:t>
+              <a:rPr lang="en-US" sz="2400" dirty="0">
+                <a:solidFill>
+                  <a:srgbClr val="FF0000"/>
+                </a:solidFill>
+              </a:rPr>
+              <a:t>Thanks to Sandip, Jake and Chris!</a:t>
+            </a:r>
+          </a:p>
+        </p:txBody>
+      </p:sp>
+      <p:sp>
+        <p:nvSpPr>
+          <p:cNvPr id="5" name="Title 1">
+            <a:extLst>
+              <a:ext uri="{FF2B5EF4-FFF2-40B4-BE49-F238E27FC236}">
+                <a16:creationId xmlns:a16="http://schemas.microsoft.com/office/drawing/2014/main" id="{83188584-34D9-EA4E-B9BA-31977A4C2424}"/>
+              </a:ext>
+            </a:extLst>
+          </p:cNvPr>
+          <p:cNvSpPr txBox="1">
+            <a:spLocks/>
+          </p:cNvSpPr>
+          <p:nvPr/>
+        </p:nvSpPr>
+        <p:spPr>
+          <a:xfrm>
+            <a:off x="3090795" y="5044622"/>
+            <a:ext cx="5349766" cy="1188720"/>
+          </a:xfrm>
+          <a:prstGeom prst="rect">
+            <a:avLst/>
+          </a:prstGeom>
+          <a:solidFill>
+            <a:schemeClr val="bg1"/>
+          </a:solidFill>
+          <a:ln w="31750" cap="sq">
+            <a:solidFill>
+              <a:schemeClr val="tx1">
+                <a:lumMod val="75000"/>
+                <a:lumOff val="25000"/>
+              </a:schemeClr>
+            </a:solidFill>
+            <a:miter lim="800000"/>
+          </a:ln>
+        </p:spPr>
+        <p:txBody>
+          <a:bodyPr vert="horz" lIns="182880" tIns="182880" rIns="182880" bIns="182880" rtlCol="0" anchor="ctr">
+            <a:normAutofit/>
+          </a:bodyPr>
+          <a:lstStyle>
+            <a:lvl1pPr algn="ctr" defTabSz="914400" rtl="0" eaLnBrk="1" latinLnBrk="0" hangingPunct="1">
+              <a:lnSpc>
+                <a:spcPct val="90000"/>
+              </a:lnSpc>
+              <a:spcBef>
+                <a:spcPct val="0"/>
+              </a:spcBef>
+              <a:buNone/>
+              <a:defRPr sz="2800" kern="1200" cap="all" spc="200" baseline="0">
+                <a:solidFill>
+                  <a:schemeClr val="tx1">
+                    <a:lumMod val="85000"/>
+                    <a:lumOff val="15000"/>
+                  </a:schemeClr>
+                </a:solidFill>
+                <a:latin typeface="+mj-lt"/>
+                <a:ea typeface="+mj-ea"/>
+                <a:cs typeface="+mj-cs"/>
+              </a:defRPr>
+            </a:lvl1pPr>
+          </a:lstStyle>
+          <a:p>
+            <a:r>
+              <a:rPr lang="en-US" dirty="0">
+                <a:solidFill>
+                  <a:srgbClr val="00B050"/>
+                </a:solidFill>
+              </a:rPr>
+              <a:t>We are ready to take Questions!</a:t>
             </a:r>
           </a:p>
         </p:txBody>
@@ -5746,6 +6410,252 @@
   <p:clrMapOvr>
     <a:masterClrMapping/>
   </p:clrMapOvr>
+  <p:timing>
+    <p:tnLst>
+      <p:par>
+        <p:cTn id="1" dur="indefinite" restart="never" nodeType="tmRoot">
+          <p:childTnLst>
+            <p:seq concurrent="1" nextAc="seek">
+              <p:cTn id="2" dur="indefinite" nodeType="mainSeq">
+                <p:childTnLst>
+                  <p:par>
+                    <p:cTn id="3" fill="hold">
+                      <p:stCondLst>
+                        <p:cond delay="indefinite"/>
+                      </p:stCondLst>
+                      <p:childTnLst>
+                        <p:par>
+                          <p:cTn id="4" fill="hold">
+                            <p:stCondLst>
+                              <p:cond delay="0"/>
+                            </p:stCondLst>
+                            <p:childTnLst>
+                              <p:par>
+                                <p:cTn id="5" presetID="53" presetClass="entr" presetSubtype="16" fill="hold" grpId="0" nodeType="clickEffect">
+                                  <p:stCondLst>
+                                    <p:cond delay="0"/>
+                                  </p:stCondLst>
+                                  <p:childTnLst>
+                                    <p:set>
+                                      <p:cBhvr>
+                                        <p:cTn id="6" dur="1" fill="hold">
+                                          <p:stCondLst>
+                                            <p:cond delay="0"/>
+                                          </p:stCondLst>
+                                        </p:cTn>
+                                        <p:tgtEl>
+                                          <p:spTgt spid="5"/>
+                                        </p:tgtEl>
+                                        <p:attrNameLst>
+                                          <p:attrName>style.visibility</p:attrName>
+                                        </p:attrNameLst>
+                                      </p:cBhvr>
+                                      <p:to>
+                                        <p:strVal val="visible"/>
+                                      </p:to>
+                                    </p:set>
+                                    <p:anim calcmode="lin" valueType="num">
+                                      <p:cBhvr>
+                                        <p:cTn id="7" dur="750" fill="hold"/>
+                                        <p:tgtEl>
+                                          <p:spTgt spid="5"/>
+                                        </p:tgtEl>
+                                        <p:attrNameLst>
+                                          <p:attrName>ppt_w</p:attrName>
+                                        </p:attrNameLst>
+                                      </p:cBhvr>
+                                      <p:tavLst>
+                                        <p:tav tm="0">
+                                          <p:val>
+                                            <p:fltVal val="0"/>
+                                          </p:val>
+                                        </p:tav>
+                                        <p:tav tm="100000">
+                                          <p:val>
+                                            <p:strVal val="#ppt_w"/>
+                                          </p:val>
+                                        </p:tav>
+                                      </p:tavLst>
+                                    </p:anim>
+                                    <p:anim calcmode="lin" valueType="num">
+                                      <p:cBhvr>
+                                        <p:cTn id="8" dur="750" fill="hold"/>
+                                        <p:tgtEl>
+                                          <p:spTgt spid="5"/>
+                                        </p:tgtEl>
+                                        <p:attrNameLst>
+                                          <p:attrName>ppt_h</p:attrName>
+                                        </p:attrNameLst>
+                                      </p:cBhvr>
+                                      <p:tavLst>
+                                        <p:tav tm="0">
+                                          <p:val>
+                                            <p:fltVal val="0"/>
+                                          </p:val>
+                                        </p:tav>
+                                        <p:tav tm="100000">
+                                          <p:val>
+                                            <p:strVal val="#ppt_h"/>
+                                          </p:val>
+                                        </p:tav>
+                                      </p:tavLst>
+                                    </p:anim>
+                                    <p:animEffect transition="in" filter="fade">
+                                      <p:cBhvr>
+                                        <p:cTn id="9" dur="750"/>
+                                        <p:tgtEl>
+                                          <p:spTgt spid="5"/>
+                                        </p:tgtEl>
+                                      </p:cBhvr>
+                                    </p:animEffect>
+                                  </p:childTnLst>
+                                </p:cTn>
+                              </p:par>
+                            </p:childTnLst>
+                          </p:cTn>
+                        </p:par>
+                        <p:par>
+                          <p:cTn id="10" fill="hold">
+                            <p:stCondLst>
+                              <p:cond delay="750"/>
+                            </p:stCondLst>
+                            <p:childTnLst>
+                              <p:par>
+                                <p:cTn id="11" presetID="31" presetClass="entr" presetSubtype="0" fill="hold" grpId="0" nodeType="afterEffect">
+                                  <p:stCondLst>
+                                    <p:cond delay="0"/>
+                                  </p:stCondLst>
+                                  <p:childTnLst>
+                                    <p:set>
+                                      <p:cBhvr>
+                                        <p:cTn id="12" dur="1" fill="hold">
+                                          <p:stCondLst>
+                                            <p:cond delay="0"/>
+                                          </p:stCondLst>
+                                        </p:cTn>
+                                        <p:tgtEl>
+                                          <p:spTgt spid="4"/>
+                                        </p:tgtEl>
+                                        <p:attrNameLst>
+                                          <p:attrName>style.visibility</p:attrName>
+                                        </p:attrNameLst>
+                                      </p:cBhvr>
+                                      <p:to>
+                                        <p:strVal val="visible"/>
+                                      </p:to>
+                                    </p:set>
+                                    <p:anim calcmode="lin" valueType="num">
+                                      <p:cBhvr>
+                                        <p:cTn id="13" dur="750" fill="hold"/>
+                                        <p:tgtEl>
+                                          <p:spTgt spid="4"/>
+                                        </p:tgtEl>
+                                        <p:attrNameLst>
+                                          <p:attrName>ppt_w</p:attrName>
+                                        </p:attrNameLst>
+                                      </p:cBhvr>
+                                      <p:tavLst>
+                                        <p:tav tm="0">
+                                          <p:val>
+                                            <p:fltVal val="0"/>
+                                          </p:val>
+                                        </p:tav>
+                                        <p:tav tm="100000">
+                                          <p:val>
+                                            <p:strVal val="#ppt_w"/>
+                                          </p:val>
+                                        </p:tav>
+                                      </p:tavLst>
+                                    </p:anim>
+                                    <p:anim calcmode="lin" valueType="num">
+                                      <p:cBhvr>
+                                        <p:cTn id="14" dur="750" fill="hold"/>
+                                        <p:tgtEl>
+                                          <p:spTgt spid="4"/>
+                                        </p:tgtEl>
+                                        <p:attrNameLst>
+                                          <p:attrName>ppt_h</p:attrName>
+                                        </p:attrNameLst>
+                                      </p:cBhvr>
+                                      <p:tavLst>
+                                        <p:tav tm="0">
+                                          <p:val>
+                                            <p:fltVal val="0"/>
+                                          </p:val>
+                                        </p:tav>
+                                        <p:tav tm="100000">
+                                          <p:val>
+                                            <p:strVal val="#ppt_h"/>
+                                          </p:val>
+                                        </p:tav>
+                                      </p:tavLst>
+                                    </p:anim>
+                                    <p:anim calcmode="lin" valueType="num">
+                                      <p:cBhvr>
+                                        <p:cTn id="15" dur="750" fill="hold"/>
+                                        <p:tgtEl>
+                                          <p:spTgt spid="4"/>
+                                        </p:tgtEl>
+                                        <p:attrNameLst>
+                                          <p:attrName>style.rotation</p:attrName>
+                                        </p:attrNameLst>
+                                      </p:cBhvr>
+                                      <p:tavLst>
+                                        <p:tav tm="0">
+                                          <p:val>
+                                            <p:fltVal val="90"/>
+                                          </p:val>
+                                        </p:tav>
+                                        <p:tav tm="100000">
+                                          <p:val>
+                                            <p:fltVal val="0"/>
+                                          </p:val>
+                                        </p:tav>
+                                      </p:tavLst>
+                                    </p:anim>
+                                    <p:animEffect transition="in" filter="fade">
+                                      <p:cBhvr>
+                                        <p:cTn id="16" dur="750"/>
+                                        <p:tgtEl>
+                                          <p:spTgt spid="4"/>
+                                        </p:tgtEl>
+                                      </p:cBhvr>
+                                    </p:animEffect>
+                                  </p:childTnLst>
+                                </p:cTn>
+                              </p:par>
+                            </p:childTnLst>
+                          </p:cTn>
+                        </p:par>
+                      </p:childTnLst>
+                    </p:cTn>
+                  </p:par>
+                </p:childTnLst>
+              </p:cTn>
+              <p:prevCondLst>
+                <p:cond evt="onPrev" delay="0">
+                  <p:tgtEl>
+                    <p:sldTgt/>
+                  </p:tgtEl>
+                </p:cond>
+              </p:prevCondLst>
+              <p:nextCondLst>
+                <p:cond evt="onNext" delay="0">
+                  <p:tgtEl>
+                    <p:sldTgt/>
+                  </p:tgtEl>
+                </p:cond>
+              </p:nextCondLst>
+            </p:seq>
+          </p:childTnLst>
+        </p:cTn>
+      </p:par>
+    </p:tnLst>
+    <p:bldLst>
+      <p:bldP spid="4" grpId="0"/>
+      <p:bldP spid="5" grpId="0" animBg="1"/>
+    </p:bldLst>
+  </p:timing>
 </p:sld>
 </file>
 
@@ -5829,8 +6739,8 @@
         </p:nvSpPr>
         <p:spPr>
           <a:xfrm>
-            <a:off x="132348" y="950496"/>
-            <a:ext cx="4271210" cy="5179667"/>
+            <a:off x="325120" y="1450487"/>
+            <a:ext cx="5344160" cy="4544422"/>
           </a:xfrm>
         </p:spPr>
         <p:txBody>
@@ -5874,7 +6784,7 @@
                   <a:srgbClr val="FFFF00"/>
                 </a:highlight>
               </a:rPr>
-              <a:t>Violent crime increased in a majority of counties … </a:t>
+              <a:t>Violent crime increased in a majority of counties …</a:t>
             </a:r>
           </a:p>
           <a:p>
@@ -5900,7 +6810,7 @@
         </p:nvSpPr>
         <p:spPr>
           <a:xfrm>
-            <a:off x="986590" y="5791609"/>
+            <a:off x="685966" y="6306177"/>
             <a:ext cx="10623884" cy="338554"/>
           </a:xfrm>
           <a:prstGeom prst="rect">
@@ -5920,11 +6830,11 @@
             </a:r>
             <a:r>
               <a:rPr lang="en-US" sz="1600" i="1" dirty="0"/>
-              <a:t>Public Policy Institute of California publication in November</a:t>
+              <a:t>Public Policy Institute of California publication (November</a:t>
             </a:r>
             <a:r>
               <a:rPr lang="en-US" sz="1600" i="1" cap="all" dirty="0"/>
-              <a:t> 2017</a:t>
+              <a:t> 2017)</a:t>
             </a:r>
             <a:r>
               <a:rPr lang="en-US" sz="1600" i="1" dirty="0"/>
@@ -5932,13 +6842,13 @@
             </a:r>
             <a:r>
               <a:rPr lang="en-US" sz="1600" i="1" dirty="0">
-                <a:hlinkClick r:id="rId2"/>
+                <a:hlinkClick r:id="rId3"/>
               </a:rPr>
               <a:t>http://www.ppic.org/publication/crime-trends-in-california</a:t>
             </a:r>
             <a:r>
               <a:rPr lang="en-US" sz="1600" dirty="0">
-                <a:hlinkClick r:id="rId2"/>
+                <a:hlinkClick r:id="rId3"/>
               </a:rPr>
               <a:t>/</a:t>
             </a:r>
@@ -5961,15 +6871,15 @@
           <p:nvPr/>
         </p:nvPicPr>
         <p:blipFill>
-          <a:blip r:embed="rId3"/>
+          <a:blip r:embed="rId4"/>
           <a:stretch>
             <a:fillRect/>
           </a:stretch>
         </p:blipFill>
         <p:spPr>
           <a:xfrm>
-            <a:off x="4541580" y="1450487"/>
-            <a:ext cx="7409433" cy="3535581"/>
+            <a:off x="5669280" y="1450487"/>
+            <a:ext cx="6272074" cy="3893673"/>
           </a:xfrm>
           <a:prstGeom prst="rect">
             <a:avLst/>
@@ -6036,8 +6946,8 @@
         </p:nvSpPr>
         <p:spPr>
           <a:xfrm>
-            <a:off x="4171589" y="419304"/>
-            <a:ext cx="3375580" cy="535157"/>
+            <a:off x="3670577" y="542083"/>
+            <a:ext cx="4699142" cy="535157"/>
           </a:xfrm>
         </p:spPr>
         <p:txBody>
@@ -6048,7 +6958,7 @@
           <a:p>
             <a:r>
               <a:rPr lang="en-US" dirty="0"/>
-              <a:t>Questions</a:t>
+              <a:t>What are we doing? </a:t>
             </a:r>
           </a:p>
         </p:txBody>
@@ -6071,87 +6981,152 @@
         </p:nvSpPr>
         <p:spPr>
           <a:xfrm>
-            <a:off x="649425" y="1299411"/>
-            <a:ext cx="10801840" cy="5005695"/>
+            <a:off x="649425" y="1077239"/>
+            <a:ext cx="10801840" cy="5576949"/>
           </a:xfrm>
         </p:spPr>
         <p:txBody>
           <a:bodyPr>
-            <a:normAutofit/>
+            <a:noAutofit/>
           </a:bodyPr>
           <a:lstStyle/>
           <a:p>
-            <a:pPr>
+            <a:pPr marL="457200" indent="-457200">
+              <a:lnSpc>
+                <a:spcPct val="150000"/>
+              </a:lnSpc>
+              <a:buFont typeface="+mj-lt"/>
+              <a:buAutoNum type="arabicPeriod"/>
+            </a:pPr>
+            <a:r>
+              <a:rPr lang="en-US" sz="2500" dirty="0">
+                <a:solidFill>
+                  <a:schemeClr val="tx1"/>
+                </a:solidFill>
+                <a:sym typeface="Wingdings" pitchFamily="2" charset="2"/>
+              </a:rPr>
+              <a:t>Focus on incidence of violent crime in Los Angeles city between 2010 to 2017. </a:t>
+            </a:r>
+          </a:p>
+          <a:p>
+            <a:pPr marL="457200" indent="-457200">
+              <a:lnSpc>
+                <a:spcPct val="150000"/>
+              </a:lnSpc>
+              <a:buFont typeface="+mj-lt"/>
+              <a:buAutoNum type="arabicPeriod"/>
+            </a:pPr>
+            <a:r>
+              <a:rPr lang="en-US" sz="2500" dirty="0">
+                <a:solidFill>
+                  <a:schemeClr val="tx1"/>
+                </a:solidFill>
+                <a:sym typeface="Wingdings" pitchFamily="2" charset="2"/>
+              </a:rPr>
+              <a:t>Analyze the nature of violent crime: </a:t>
+            </a:r>
+          </a:p>
+          <a:p>
+            <a:pPr lvl="4">
               <a:lnSpc>
                 <a:spcPct val="150000"/>
               </a:lnSpc>
               <a:buFont typeface="Wingdings" pitchFamily="2" charset="2"/>
-              <a:buChar char="à"/>
+              <a:buChar char="Ø"/>
             </a:pPr>
             <a:r>
-              <a:rPr lang="en-US" sz="3200" dirty="0">
+              <a:rPr lang="en-US" sz="2500" dirty="0">
+                <a:solidFill>
+                  <a:schemeClr val="tx1"/>
+                </a:solidFill>
                 <a:sym typeface="Wingdings" pitchFamily="2" charset="2"/>
               </a:rPr>
-              <a:t> Focus on incidence of crime in Los Angeles city:  </a:t>
-            </a:r>
-          </a:p>
-          <a:p>
-            <a:pPr lvl="1">
+              <a:t> Are certain months/years more crime prone? </a:t>
+            </a:r>
+          </a:p>
+          <a:p>
+            <a:pPr lvl="4">
               <a:lnSpc>
                 <a:spcPct val="150000"/>
               </a:lnSpc>
               <a:buFont typeface="Wingdings" pitchFamily="2" charset="2"/>
-              <a:buChar char="à"/>
+              <a:buChar char="Ø"/>
             </a:pPr>
             <a:r>
-              <a:rPr lang="en-US" sz="3000" dirty="0">
+              <a:rPr lang="en-US" sz="2500" dirty="0">
+                <a:solidFill>
+                  <a:schemeClr val="tx1"/>
+                </a:solidFill>
                 <a:sym typeface="Wingdings" pitchFamily="2" charset="2"/>
               </a:rPr>
-              <a:t>Trends in violent crime rates </a:t>
-            </a:r>
-          </a:p>
-          <a:p>
-            <a:pPr lvl="1">
+              <a:t> Do demographics of the place where the crime was committed matter?</a:t>
+            </a:r>
+          </a:p>
+          <a:p>
+            <a:pPr marL="457200" indent="-457200">
+              <a:lnSpc>
+                <a:spcPct val="150000"/>
+              </a:lnSpc>
+              <a:buFont typeface="+mj-lt"/>
+              <a:buAutoNum type="arabicPeriod"/>
+            </a:pPr>
+            <a:r>
+              <a:rPr lang="en-US" sz="2500" dirty="0"/>
+              <a:t>To help understand the nature of violent crime, we use: </a:t>
+            </a:r>
+          </a:p>
+          <a:p>
+            <a:pPr lvl="4">
               <a:lnSpc>
                 <a:spcPct val="150000"/>
               </a:lnSpc>
               <a:buFont typeface="Wingdings" pitchFamily="2" charset="2"/>
-              <a:buChar char="à"/>
+              <a:buChar char="Ø"/>
             </a:pPr>
             <a:r>
-              <a:rPr lang="en-US" sz="3000" dirty="0">
-                <a:sym typeface="Wingdings" pitchFamily="2" charset="2"/>
-              </a:rPr>
-              <a:t>2010 to 2017. </a:t>
-            </a:r>
-          </a:p>
-          <a:p>
-            <a:pPr>
+              <a:rPr lang="en-US" sz="2500" dirty="0"/>
+              <a:t> Graphs and Charts</a:t>
+            </a:r>
+          </a:p>
+          <a:p>
+            <a:pPr lvl="4">
               <a:lnSpc>
                 <a:spcPct val="150000"/>
               </a:lnSpc>
               <a:buFont typeface="Wingdings" pitchFamily="2" charset="2"/>
-              <a:buChar char="à"/>
+              <a:buChar char="Ø"/>
             </a:pPr>
             <a:r>
-              <a:rPr lang="en-US" sz="3200" dirty="0">
-                <a:sym typeface="Wingdings" pitchFamily="2" charset="2"/>
-              </a:rPr>
-              <a:t> More specifically: </a:t>
-            </a:r>
-          </a:p>
-          <a:p>
-            <a:pPr lvl="3">
+              <a:rPr lang="en-US" sz="2500" dirty="0"/>
+              <a:t> Simple Regressions</a:t>
+            </a:r>
+          </a:p>
+          <a:p>
+            <a:pPr lvl="4">
               <a:lnSpc>
                 <a:spcPct val="150000"/>
               </a:lnSpc>
               <a:buFont typeface="Wingdings" pitchFamily="2" charset="2"/>
-              <a:buChar char="à"/>
+              <a:buChar char="Ø"/>
             </a:pPr>
             <a:r>
-              <a:rPr lang="en-US" sz="3000" dirty="0"/>
-              <a:t> </a:t>
-            </a:r>
+              <a:rPr lang="en-US" sz="2500" dirty="0"/>
+              <a:t> Interactive Maps </a:t>
+            </a:r>
+          </a:p>
+          <a:p>
+            <a:pPr marL="457200" lvl="2" indent="0">
+              <a:lnSpc>
+                <a:spcPct val="150000"/>
+              </a:lnSpc>
+              <a:buNone/>
+            </a:pPr>
+            <a:endParaRPr lang="en-US" sz="2500" dirty="0">
+              <a:solidFill>
+                <a:schemeClr val="tx1"/>
+              </a:solidFill>
+              <a:sym typeface="Wingdings" pitchFamily="2" charset="2"/>
+            </a:endParaRPr>
           </a:p>
         </p:txBody>
       </p:sp>
@@ -6244,7 +7219,7 @@
         </p:nvSpPr>
         <p:spPr>
           <a:xfrm>
-            <a:off x="1339702" y="1637414"/>
+            <a:off x="1334088" y="1373009"/>
             <a:ext cx="9583710" cy="4437497"/>
           </a:xfrm>
           <a:prstGeom prst="rect">
@@ -6278,7 +7253,7 @@
             </a:pPr>
             <a:r>
               <a:rPr lang="en-US" sz="3200" dirty="0"/>
-              <a:t>Data Cleaning &amp; Technical Applications</a:t>
+              <a:t>Data Cleaning</a:t>
             </a:r>
           </a:p>
           <a:p>
@@ -6290,7 +7265,7 @@
             </a:pPr>
             <a:r>
               <a:rPr lang="en-US" sz="3200" dirty="0"/>
-              <a:t>Data Description</a:t>
+              <a:t>Description</a:t>
             </a:r>
           </a:p>
           <a:p>
@@ -6326,7 +7301,7 @@
             </a:pPr>
             <a:r>
               <a:rPr lang="en-US" sz="3200" dirty="0"/>
-              <a:t>Future Work/Assignments</a:t>
+              <a:t>Future Work</a:t>
             </a:r>
           </a:p>
         </p:txBody>
@@ -6401,7 +7376,7 @@
           <a:p>
             <a:r>
               <a:rPr lang="en-US" dirty="0"/>
-              <a:t>Data Sources</a:t>
+              <a:t>1. Data Sources</a:t>
             </a:r>
           </a:p>
         </p:txBody>
@@ -6424,8 +7399,8 @@
         </p:nvSpPr>
         <p:spPr>
           <a:xfrm>
-            <a:off x="664667" y="1669606"/>
-            <a:ext cx="11020502" cy="3923126"/>
+            <a:off x="1299714" y="1732236"/>
+            <a:ext cx="9362695" cy="2839764"/>
           </a:xfrm>
         </p:spPr>
         <p:txBody>
@@ -6435,54 +7410,42 @@
           <a:lstStyle/>
           <a:p>
             <a:pPr marL="514350" indent="-514350">
-              <a:lnSpc>
-                <a:spcPct val="150000"/>
-              </a:lnSpc>
+              <a:buFont typeface="+mj-lt"/>
               <a:buAutoNum type="arabicPeriod"/>
             </a:pPr>
             <a:r>
               <a:rPr lang="en-US" sz="3200" dirty="0"/>
-              <a:t>Incidence of Crime Data: Los Angeles Open Data </a:t>
+              <a:t>Incidence of Crime Data: Los Angeles Open Data: (</a:t>
+            </a:r>
+            <a:r>
+              <a:rPr lang="en-US" sz="3200" i="1" dirty="0">
+                <a:hlinkClick r:id="rId2"/>
+              </a:rPr>
+              <a:t>https://data.lacity.org/A-Safe-City/Crime-Data-from-2010-to-Present/y8tr-7khq</a:t>
+            </a:r>
+            <a:r>
+              <a:rPr lang="en-US" sz="3200" dirty="0"/>
+              <a:t>) </a:t>
             </a:r>
           </a:p>
           <a:p>
             <a:pPr marL="514350" indent="-514350">
-              <a:lnSpc>
-                <a:spcPct val="150000"/>
-              </a:lnSpc>
+              <a:buFont typeface="+mj-lt"/>
               <a:buAutoNum type="arabicPeriod"/>
             </a:pPr>
             <a:r>
               <a:rPr lang="en-US" sz="3200" dirty="0"/>
-              <a:t>Demographic and Socio-Economic Data: Los Angeles Census Reporter</a:t>
-            </a:r>
-          </a:p>
-          <a:p>
-            <a:pPr marL="514350" indent="-514350">
-              <a:lnSpc>
-                <a:spcPct val="150000"/>
-              </a:lnSpc>
-              <a:buAutoNum type="arabicPeriod"/>
-            </a:pPr>
-            <a:r>
-              <a:rPr lang="en-US" sz="3600" dirty="0"/>
-              <a:t>Mapping</a:t>
-            </a:r>
-            <a:r>
-              <a:rPr lang="en-US" sz="3200" dirty="0"/>
-              <a:t> Library: Folium 0.6.0</a:t>
-            </a:r>
-          </a:p>
-          <a:p>
-            <a:pPr marL="514350" indent="-514350">
-              <a:lnSpc>
-                <a:spcPct val="150000"/>
-              </a:lnSpc>
-              <a:buAutoNum type="arabicPeriod"/>
-            </a:pPr>
-            <a:r>
-              <a:rPr lang="en-US" sz="3200" dirty="0"/>
-              <a:t>Boundary Files for Mapping:  L.A. Boundaries API</a:t>
+              <a:t>Demographic and Socio-Economic Data: Los Angeles Census Reporter: (</a:t>
+            </a:r>
+            <a:r>
+              <a:rPr lang="en-US" sz="3200" i="1" dirty="0">
+                <a:hlinkClick r:id="rId3"/>
+              </a:rPr>
+              <a:t>https://censusreporter.org/profiles/16000US0644000-los-angeles-ca/</a:t>
+            </a:r>
+            <a:r>
+              <a:rPr lang="en-US" sz="3200" i="1" dirty="0"/>
+              <a:t>)</a:t>
             </a:r>
           </a:p>
         </p:txBody>
@@ -6501,179 +7464,6 @@
 </file>
 
 <file path=ppt/slides/slide7.xml><?xml version="1.0" encoding="utf-8"?>
-<p:sld xmlns:a="http://schemas.openxmlformats.org/drawingml/2006/main" xmlns:r="http://schemas.openxmlformats.org/officeDocument/2006/relationships" xmlns:p="http://schemas.openxmlformats.org/presentationml/2006/main">
-  <p:cSld>
-    <p:bg>
-      <p:bgPr>
-        <a:solidFill>
-          <a:schemeClr val="bg2">
-            <a:alpha val="0"/>
-          </a:schemeClr>
-        </a:solidFill>
-        <a:effectLst/>
-      </p:bgPr>
-    </p:bg>
-    <p:spTree>
-      <p:nvGrpSpPr>
-        <p:cNvPr id="1" name=""/>
-        <p:cNvGrpSpPr/>
-        <p:nvPr/>
-      </p:nvGrpSpPr>
-      <p:grpSpPr>
-        <a:xfrm>
-          <a:off x="0" y="0"/>
-          <a:ext cx="0" cy="0"/>
-          <a:chOff x="0" y="0"/>
-          <a:chExt cx="0" cy="0"/>
-        </a:xfrm>
-      </p:grpSpPr>
-      <p:sp>
-        <p:nvSpPr>
-          <p:cNvPr id="2" name="Title 1">
-            <a:extLst>
-              <a:ext uri="{FF2B5EF4-FFF2-40B4-BE49-F238E27FC236}">
-                <a16:creationId xmlns:a16="http://schemas.microsoft.com/office/drawing/2014/main" id="{6A74D095-0384-4E74-A61F-43B44B852868}"/>
-              </a:ext>
-            </a:extLst>
-          </p:cNvPr>
-          <p:cNvSpPr>
-            <a:spLocks noGrp="1"/>
-          </p:cNvSpPr>
-          <p:nvPr>
-            <p:ph type="title"/>
-          </p:nvPr>
-        </p:nvSpPr>
-        <p:spPr>
-          <a:xfrm>
-            <a:off x="2449136" y="619049"/>
-            <a:ext cx="7353614" cy="563968"/>
-          </a:xfrm>
-        </p:spPr>
-        <p:txBody>
-          <a:bodyPr>
-            <a:normAutofit fontScale="90000"/>
-          </a:bodyPr>
-          <a:lstStyle/>
-          <a:p>
-            <a:r>
-              <a:rPr lang="en-US" sz="4000" dirty="0"/>
-              <a:t>Rest of the presentation</a:t>
-            </a:r>
-          </a:p>
-        </p:txBody>
-      </p:sp>
-      <p:sp>
-        <p:nvSpPr>
-          <p:cNvPr id="6" name="TextBox 5">
-            <a:extLst>
-              <a:ext uri="{FF2B5EF4-FFF2-40B4-BE49-F238E27FC236}">
-                <a16:creationId xmlns:a16="http://schemas.microsoft.com/office/drawing/2014/main" id="{AD9DB1C8-1735-7749-A35C-AF4B22EC4708}"/>
-              </a:ext>
-            </a:extLst>
-          </p:cNvPr>
-          <p:cNvSpPr txBox="1"/>
-          <p:nvPr/>
-        </p:nvSpPr>
-        <p:spPr>
-          <a:xfrm>
-            <a:off x="1339702" y="1637414"/>
-            <a:ext cx="9583710" cy="3698833"/>
-          </a:xfrm>
-          <a:prstGeom prst="rect">
-            <a:avLst/>
-          </a:prstGeom>
-          <a:noFill/>
-        </p:spPr>
-        <p:txBody>
-          <a:bodyPr wrap="square" rtlCol="0">
-            <a:spAutoFit/>
-          </a:bodyPr>
-          <a:lstStyle/>
-          <a:p>
-            <a:pPr marL="457200" indent="-457200">
-              <a:lnSpc>
-                <a:spcPct val="150000"/>
-              </a:lnSpc>
-              <a:buFont typeface="Arial" panose="020B0604020202020204" pitchFamily="34" charset="0"/>
-              <a:buChar char="•"/>
-            </a:pPr>
-            <a:r>
-              <a:rPr lang="en-US" sz="3200" dirty="0">
-                <a:solidFill>
-                  <a:srgbClr val="FF0000"/>
-                </a:solidFill>
-              </a:rPr>
-              <a:t>Data Cleaning &amp; Technical Applications</a:t>
-            </a:r>
-          </a:p>
-          <a:p>
-            <a:pPr marL="457200" indent="-457200">
-              <a:lnSpc>
-                <a:spcPct val="150000"/>
-              </a:lnSpc>
-              <a:buFont typeface="Arial" panose="020B0604020202020204" pitchFamily="34" charset="0"/>
-              <a:buChar char="•"/>
-            </a:pPr>
-            <a:r>
-              <a:rPr lang="en-US" sz="3200" dirty="0"/>
-              <a:t>Data Description</a:t>
-            </a:r>
-          </a:p>
-          <a:p>
-            <a:pPr marL="457200" indent="-457200">
-              <a:lnSpc>
-                <a:spcPct val="150000"/>
-              </a:lnSpc>
-              <a:buFont typeface="Arial" panose="020B0604020202020204" pitchFamily="34" charset="0"/>
-              <a:buChar char="•"/>
-            </a:pPr>
-            <a:r>
-              <a:rPr lang="en-US" sz="3200" dirty="0"/>
-              <a:t>Results</a:t>
-            </a:r>
-          </a:p>
-          <a:p>
-            <a:pPr marL="457200" indent="-457200">
-              <a:lnSpc>
-                <a:spcPct val="150000"/>
-              </a:lnSpc>
-              <a:buFont typeface="Arial" panose="020B0604020202020204" pitchFamily="34" charset="0"/>
-              <a:buChar char="•"/>
-            </a:pPr>
-            <a:r>
-              <a:rPr lang="en-US" sz="3200" dirty="0"/>
-              <a:t>Conclusions</a:t>
-            </a:r>
-          </a:p>
-          <a:p>
-            <a:pPr marL="457200" indent="-457200">
-              <a:lnSpc>
-                <a:spcPct val="150000"/>
-              </a:lnSpc>
-              <a:buFont typeface="Arial" panose="020B0604020202020204" pitchFamily="34" charset="0"/>
-              <a:buChar char="•"/>
-            </a:pPr>
-            <a:r>
-              <a:rPr lang="en-US" sz="3200" dirty="0"/>
-              <a:t>Future Work/Assignments</a:t>
-            </a:r>
-          </a:p>
-        </p:txBody>
-      </p:sp>
-    </p:spTree>
-    <p:extLst>
-      <p:ext uri="{BB962C8B-B14F-4D97-AF65-F5344CB8AC3E}">
-        <p14:creationId xmlns:p14="http://schemas.microsoft.com/office/powerpoint/2010/main" val="1205038651"/>
-      </p:ext>
-    </p:extLst>
-  </p:cSld>
-  <p:clrMapOvr>
-    <a:masterClrMapping/>
-  </p:clrMapOvr>
-</p:sld>
-</file>
-
-<file path=ppt/slides/slide8.xml><?xml version="1.0" encoding="utf-8"?>
 <p:sld xmlns:a="http://schemas.openxmlformats.org/drawingml/2006/main" xmlns:r="http://schemas.openxmlformats.org/officeDocument/2006/relationships" xmlns:p="http://schemas.openxmlformats.org/presentationml/2006/main" showMasterSp="0">
   <p:cSld>
     <p:bg>
@@ -6705,7 +7495,7 @@
           <p:cNvPr id="2" name="Title 1">
             <a:extLst>
               <a:ext uri="{FF2B5EF4-FFF2-40B4-BE49-F238E27FC236}">
-                <a16:creationId xmlns:a16="http://schemas.microsoft.com/office/drawing/2014/main" id="{CB8EA109-D31F-8447-B07E-2D3B43636355}"/>
+                <a16:creationId xmlns:a16="http://schemas.microsoft.com/office/drawing/2014/main" id="{76A47BE7-C968-4C6E-B64E-28E7C87E7F1B}"/>
               </a:ext>
             </a:extLst>
           </p:cNvPr>
@@ -6718,23 +7508,166 @@
         </p:nvSpPr>
         <p:spPr>
           <a:xfrm>
-            <a:off x="1988819" y="420993"/>
-            <a:ext cx="8835700" cy="1234811"/>
+            <a:off x="4014842" y="181361"/>
+            <a:ext cx="4042611" cy="479651"/>
           </a:xfrm>
         </p:spPr>
         <p:txBody>
           <a:bodyPr>
-            <a:normAutofit/>
+            <a:noAutofit/>
           </a:bodyPr>
           <a:lstStyle/>
           <a:p>
             <a:r>
-              <a:rPr lang="en-US" dirty="0">
+              <a:rPr lang="en-US" dirty="0"/>
+              <a:t>1. Data Sources</a:t>
+            </a:r>
+          </a:p>
+        </p:txBody>
+      </p:sp>
+      <p:sp>
+        <p:nvSpPr>
+          <p:cNvPr id="3" name="Content Placeholder 2">
+            <a:extLst>
+              <a:ext uri="{FF2B5EF4-FFF2-40B4-BE49-F238E27FC236}">
+                <a16:creationId xmlns:a16="http://schemas.microsoft.com/office/drawing/2014/main" id="{68EEF821-166E-43EC-9FC5-16D24568EFAB}"/>
+              </a:ext>
+            </a:extLst>
+          </p:cNvPr>
+          <p:cNvSpPr>
+            <a:spLocks noGrp="1"/>
+          </p:cNvSpPr>
+          <p:nvPr>
+            <p:ph idx="1"/>
+          </p:nvPr>
+        </p:nvSpPr>
+        <p:spPr>
+          <a:xfrm>
+            <a:off x="434070" y="738130"/>
+            <a:ext cx="11204153" cy="5894024"/>
+          </a:xfrm>
+        </p:spPr>
+        <p:txBody>
+          <a:bodyPr>
+            <a:noAutofit/>
+          </a:bodyPr>
+          <a:lstStyle/>
+          <a:p>
+            <a:pPr marL="514350" indent="-514350" algn="just">
+              <a:buFont typeface="+mj-lt"/>
+              <a:buAutoNum type="romanUcPeriod"/>
+            </a:pPr>
+            <a:r>
+              <a:rPr lang="en-US" sz="2500" dirty="0"/>
+              <a:t>Incidence of Crime Data: Los Angeles Open Data:</a:t>
+            </a:r>
+          </a:p>
+          <a:p>
+            <a:pPr lvl="1" algn="just">
+              <a:buFont typeface="Wingdings" pitchFamily="2" charset="2"/>
+              <a:buChar char="ü"/>
+            </a:pPr>
+            <a:r>
+              <a:rPr lang="en-US" sz="2100" dirty="0">
                 <a:solidFill>
-                  <a:schemeClr val="tx1"/>
+                  <a:srgbClr val="132BC0"/>
                 </a:solidFill>
               </a:rPr>
-              <a:t>Data Cleaning &amp; Technical Applications</a:t>
+              <a:t>Reflects incidents of crime in the City of Los Angeles dating back to 2010. </a:t>
+            </a:r>
+          </a:p>
+          <a:p>
+            <a:pPr lvl="1" algn="just">
+              <a:buFont typeface="Wingdings" pitchFamily="2" charset="2"/>
+              <a:buChar char="ü"/>
+            </a:pPr>
+            <a:r>
+              <a:rPr lang="en-US" sz="2100" dirty="0">
+                <a:solidFill>
+                  <a:srgbClr val="132BC0"/>
+                </a:solidFill>
+              </a:rPr>
+              <a:t>Data provided by Los Angeles Police Department. Last updated: August 14, 2018 </a:t>
+            </a:r>
+          </a:p>
+          <a:p>
+            <a:pPr lvl="1" algn="just">
+              <a:buFont typeface="Wingdings" pitchFamily="2" charset="2"/>
+              <a:buChar char="ü"/>
+            </a:pPr>
+            <a:r>
+              <a:rPr lang="en-US" sz="2100" dirty="0">
+                <a:solidFill>
+                  <a:srgbClr val="132BC0"/>
+                </a:solidFill>
+              </a:rPr>
+              <a:t>Transcribed from original crime reports that were typed on paper and therefore there may be some inaccuracies within the data. Address fields are only provided to the nearest hundred block in order to maintain privacy. </a:t>
+            </a:r>
+          </a:p>
+          <a:p>
+            <a:pPr marL="514350" indent="-514350" algn="just">
+              <a:buFont typeface="+mj-lt"/>
+              <a:buAutoNum type="romanUcPeriod"/>
+            </a:pPr>
+            <a:r>
+              <a:rPr lang="en-US" sz="2500" dirty="0"/>
+              <a:t>Demographic and Socio-Economic Data: Los Angeles Census Reporter</a:t>
+            </a:r>
+          </a:p>
+          <a:p>
+            <a:pPr lvl="1" algn="just">
+              <a:buFont typeface="Wingdings" pitchFamily="2" charset="2"/>
+              <a:buChar char="ü"/>
+            </a:pPr>
+            <a:r>
+              <a:rPr lang="en-US" sz="2100" dirty="0">
+                <a:solidFill>
+                  <a:srgbClr val="132BC0"/>
+                </a:solidFill>
+              </a:rPr>
+              <a:t>The American Community Survey is at the heart of Census Reporter. </a:t>
+            </a:r>
+          </a:p>
+          <a:p>
+            <a:pPr lvl="1" algn="just">
+              <a:buFont typeface="Wingdings" pitchFamily="2" charset="2"/>
+              <a:buChar char="ü"/>
+            </a:pPr>
+            <a:r>
+              <a:rPr lang="en-US" sz="2100" dirty="0">
+                <a:solidFill>
+                  <a:srgbClr val="132BC0"/>
+                </a:solidFill>
+              </a:rPr>
+              <a:t>This survey is conducted continuously, and data is released annually in two forms. </a:t>
+            </a:r>
+          </a:p>
+          <a:p>
+            <a:pPr lvl="1" algn="just">
+              <a:buFont typeface="Wingdings" pitchFamily="2" charset="2"/>
+              <a:buChar char="ü"/>
+            </a:pPr>
+            <a:r>
+              <a:rPr lang="en-US" sz="2100" dirty="0">
+                <a:solidFill>
+                  <a:srgbClr val="132BC0"/>
+                </a:solidFill>
+              </a:rPr>
+              <a:t>We use the 5-year release, which is available for almost all Census geographies, block group and larger. </a:t>
+            </a:r>
+          </a:p>
+          <a:p>
+            <a:pPr lvl="1" algn="just">
+              <a:buFont typeface="Wingdings" pitchFamily="2" charset="2"/>
+              <a:buChar char="ü"/>
+            </a:pPr>
+            <a:r>
+              <a:rPr lang="en-US" sz="2100" dirty="0">
+                <a:solidFill>
+                  <a:srgbClr val="132BC0"/>
+                </a:solidFill>
+              </a:rPr>
+              <a:t>It provides information on age, sex, race and housing, education, income, occupation, veteran status, ancestry, and other interesting topics. </a:t>
             </a:r>
           </a:p>
         </p:txBody>
@@ -6742,7 +7675,7 @@
     </p:spTree>
     <p:extLst>
       <p:ext uri="{BB962C8B-B14F-4D97-AF65-F5344CB8AC3E}">
-        <p14:creationId xmlns:p14="http://schemas.microsoft.com/office/powerpoint/2010/main" val="1712794013"/>
+        <p14:creationId xmlns:p14="http://schemas.microsoft.com/office/powerpoint/2010/main" val="466545152"/>
       </p:ext>
     </p:extLst>
   </p:cSld>
@@ -6752,14 +7685,14 @@
 </p:sld>
 </file>
 
-<file path=ppt/slides/slide9.xml><?xml version="1.0" encoding="utf-8"?>
-<p:sld xmlns:a="http://schemas.openxmlformats.org/drawingml/2006/main" xmlns:r="http://schemas.openxmlformats.org/officeDocument/2006/relationships" xmlns:p="http://schemas.openxmlformats.org/presentationml/2006/main">
+<file path=ppt/slides/slide8.xml><?xml version="1.0" encoding="utf-8"?>
+<p:sld xmlns:a="http://schemas.openxmlformats.org/drawingml/2006/main" xmlns:r="http://schemas.openxmlformats.org/officeDocument/2006/relationships" xmlns:p="http://schemas.openxmlformats.org/presentationml/2006/main" show="0">
   <p:cSld>
     <p:bg>
       <p:bgPr>
         <a:solidFill>
           <a:schemeClr val="bg2">
-            <a:alpha val="1000"/>
+            <a:alpha val="0"/>
           </a:schemeClr>
         </a:solidFill>
         <a:effectLst/>
@@ -6828,8 +7761,8 @@
         </p:nvSpPr>
         <p:spPr>
           <a:xfrm>
-            <a:off x="1297172" y="1637414"/>
-            <a:ext cx="9626240" cy="3318665"/>
+            <a:off x="1339702" y="1637414"/>
+            <a:ext cx="9583710" cy="3698833"/>
           </a:xfrm>
           <a:prstGeom prst="rect">
             <a:avLst/>
@@ -6842,7 +7775,7 @@
           </a:bodyPr>
           <a:lstStyle/>
           <a:p>
-            <a:pPr marL="571500" indent="-571500">
+            <a:pPr marL="457200" indent="-457200">
               <a:lnSpc>
                 <a:spcPct val="150000"/>
               </a:lnSpc>
@@ -6850,16 +7783,12 @@
               <a:buChar char="•"/>
             </a:pPr>
             <a:r>
-              <a:rPr lang="en-US" sz="3600" dirty="0">
-                <a:solidFill>
-                  <a:srgbClr val="FF0000"/>
-                </a:solidFill>
-              </a:rPr>
-              <a:t>Data Description</a:t>
-            </a:r>
-          </a:p>
-          <a:p>
-            <a:pPr marL="571500" indent="-571500">
+              <a:rPr lang="en-US" sz="3200" dirty="0"/>
+              <a:t>Data Cleaning</a:t>
+            </a:r>
+          </a:p>
+          <a:p>
+            <a:pPr marL="457200" indent="-457200">
               <a:lnSpc>
                 <a:spcPct val="150000"/>
               </a:lnSpc>
@@ -6867,12 +7796,12 @@
               <a:buChar char="•"/>
             </a:pPr>
             <a:r>
-              <a:rPr lang="en-US" sz="3600" dirty="0"/>
-              <a:t>Results</a:t>
-            </a:r>
-          </a:p>
-          <a:p>
-            <a:pPr marL="571500" indent="-571500">
+              <a:rPr lang="en-US" sz="3200" dirty="0"/>
+              <a:t>Description</a:t>
+            </a:r>
+          </a:p>
+          <a:p>
+            <a:pPr marL="457200" indent="-457200">
               <a:lnSpc>
                 <a:spcPct val="150000"/>
               </a:lnSpc>
@@ -6880,12 +7809,12 @@
               <a:buChar char="•"/>
             </a:pPr>
             <a:r>
-              <a:rPr lang="en-US" sz="3600" dirty="0"/>
-              <a:t>Conclusions</a:t>
-            </a:r>
-          </a:p>
-          <a:p>
-            <a:pPr marL="571500" indent="-571500">
+              <a:rPr lang="en-US" sz="3200" dirty="0"/>
+              <a:t>Results</a:t>
+            </a:r>
+          </a:p>
+          <a:p>
+            <a:pPr marL="457200" indent="-457200">
               <a:lnSpc>
                 <a:spcPct val="150000"/>
               </a:lnSpc>
@@ -6893,7 +7822,20 @@
               <a:buChar char="•"/>
             </a:pPr>
             <a:r>
-              <a:rPr lang="en-US" sz="3600" dirty="0"/>
+              <a:rPr lang="en-US" sz="3200" dirty="0"/>
+              <a:t>Conclusions</a:t>
+            </a:r>
+          </a:p>
+          <a:p>
+            <a:pPr marL="457200" indent="-457200">
+              <a:lnSpc>
+                <a:spcPct val="150000"/>
+              </a:lnSpc>
+              <a:buFont typeface="Arial" panose="020B0604020202020204" pitchFamily="34" charset="0"/>
+              <a:buChar char="•"/>
+            </a:pPr>
+            <a:r>
+              <a:rPr lang="en-US" sz="3200" dirty="0"/>
               <a:t>Future Work/Assignments</a:t>
             </a:r>
           </a:p>
@@ -6902,7 +7844,175 @@
     </p:spTree>
     <p:extLst>
       <p:ext uri="{BB962C8B-B14F-4D97-AF65-F5344CB8AC3E}">
-        <p14:creationId xmlns:p14="http://schemas.microsoft.com/office/powerpoint/2010/main" val="1762444825"/>
+        <p14:creationId xmlns:p14="http://schemas.microsoft.com/office/powerpoint/2010/main" val="1205038651"/>
+      </p:ext>
+    </p:extLst>
+  </p:cSld>
+  <p:clrMapOvr>
+    <a:masterClrMapping/>
+  </p:clrMapOvr>
+</p:sld>
+</file>
+
+<file path=ppt/slides/slide9.xml><?xml version="1.0" encoding="utf-8"?>
+<p:sld xmlns:a="http://schemas.openxmlformats.org/drawingml/2006/main" xmlns:r="http://schemas.openxmlformats.org/officeDocument/2006/relationships" xmlns:p="http://schemas.openxmlformats.org/presentationml/2006/main" showMasterSp="0">
+  <p:cSld>
+    <p:bg>
+      <p:bgPr>
+        <a:solidFill>
+          <a:schemeClr val="bg2">
+            <a:alpha val="0"/>
+          </a:schemeClr>
+        </a:solidFill>
+        <a:effectLst/>
+      </p:bgPr>
+    </p:bg>
+    <p:spTree>
+      <p:nvGrpSpPr>
+        <p:cNvPr id="1" name=""/>
+        <p:cNvGrpSpPr/>
+        <p:nvPr/>
+      </p:nvGrpSpPr>
+      <p:grpSpPr>
+        <a:xfrm>
+          <a:off x="0" y="0"/>
+          <a:ext cx="0" cy="0"/>
+          <a:chOff x="0" y="0"/>
+          <a:chExt cx="0" cy="0"/>
+        </a:xfrm>
+      </p:grpSpPr>
+      <p:sp>
+        <p:nvSpPr>
+          <p:cNvPr id="2" name="Title 1">
+            <a:extLst>
+              <a:ext uri="{FF2B5EF4-FFF2-40B4-BE49-F238E27FC236}">
+                <a16:creationId xmlns:a16="http://schemas.microsoft.com/office/drawing/2014/main" id="{CB8EA109-D31F-8447-B07E-2D3B43636355}"/>
+              </a:ext>
+            </a:extLst>
+          </p:cNvPr>
+          <p:cNvSpPr>
+            <a:spLocks noGrp="1"/>
+          </p:cNvSpPr>
+          <p:nvPr>
+            <p:ph type="title"/>
+          </p:nvPr>
+        </p:nvSpPr>
+        <p:spPr>
+          <a:xfrm>
+            <a:off x="3029638" y="211673"/>
+            <a:ext cx="6021165" cy="713744"/>
+          </a:xfrm>
+        </p:spPr>
+        <p:txBody>
+          <a:bodyPr>
+            <a:normAutofit fontScale="90000"/>
+          </a:bodyPr>
+          <a:lstStyle/>
+          <a:p>
+            <a:r>
+              <a:rPr lang="en-US" dirty="0">
+                <a:solidFill>
+                  <a:schemeClr val="tx1"/>
+                </a:solidFill>
+              </a:rPr>
+              <a:t>2. Data Cleaning</a:t>
+            </a:r>
+          </a:p>
+        </p:txBody>
+      </p:sp>
+      <p:sp>
+        <p:nvSpPr>
+          <p:cNvPr id="3" name="TextBox 2">
+            <a:extLst>
+              <a:ext uri="{FF2B5EF4-FFF2-40B4-BE49-F238E27FC236}">
+                <a16:creationId xmlns:a16="http://schemas.microsoft.com/office/drawing/2014/main" id="{A1F923EF-DD6B-D64F-AA57-B0A8C523E221}"/>
+              </a:ext>
+            </a:extLst>
+          </p:cNvPr>
+          <p:cNvSpPr txBox="1"/>
+          <p:nvPr/>
+        </p:nvSpPr>
+        <p:spPr>
+          <a:xfrm>
+            <a:off x="716096" y="1233889"/>
+            <a:ext cx="9805012" cy="2785378"/>
+          </a:xfrm>
+          <a:prstGeom prst="rect">
+            <a:avLst/>
+          </a:prstGeom>
+          <a:noFill/>
+        </p:spPr>
+        <p:txBody>
+          <a:bodyPr wrap="square" rtlCol="0">
+            <a:spAutoFit/>
+          </a:bodyPr>
+          <a:lstStyle/>
+          <a:p>
+            <a:pPr marL="914400" lvl="1" indent="-457200">
+              <a:buAutoNum type="arabicPeriod"/>
+            </a:pPr>
+            <a:r>
+              <a:rPr lang="en-US" sz="2500" dirty="0"/>
+              <a:t>Used Pandas to clean and format the data set(s). Code is available on a </a:t>
+            </a:r>
+            <a:r>
+              <a:rPr lang="en-US" sz="2500" dirty="0" err="1"/>
+              <a:t>Github</a:t>
+            </a:r>
+            <a:r>
+              <a:rPr lang="en-US" sz="2500" dirty="0"/>
+              <a:t> repository</a:t>
+            </a:r>
+          </a:p>
+          <a:p>
+            <a:pPr marL="914400" lvl="1" indent="-457200">
+              <a:buAutoNum type="arabicPeriod"/>
+            </a:pPr>
+            <a:r>
+              <a:rPr lang="en-US" sz="2500" dirty="0"/>
+              <a:t>Create a </a:t>
+            </a:r>
+            <a:r>
+              <a:rPr lang="en-US" sz="2500" dirty="0" err="1"/>
+              <a:t>Jupyter</a:t>
+            </a:r>
+            <a:r>
+              <a:rPr lang="en-US" sz="2500" dirty="0"/>
+              <a:t> Notebook describing the data exploration and cleanup process</a:t>
+            </a:r>
+          </a:p>
+          <a:p>
+            <a:pPr marL="914400" lvl="1" indent="-457200">
+              <a:buAutoNum type="arabicPeriod"/>
+            </a:pPr>
+            <a:r>
+              <a:rPr lang="en-US" sz="2500" dirty="0"/>
+              <a:t>Create a </a:t>
+            </a:r>
+            <a:r>
+              <a:rPr lang="en-US" sz="2500" dirty="0" err="1"/>
+              <a:t>Jupyter</a:t>
+            </a:r>
+            <a:r>
+              <a:rPr lang="en-US" sz="2500" dirty="0"/>
+              <a:t> Notebook illustrating the final data analysis</a:t>
+            </a:r>
+          </a:p>
+          <a:p>
+            <a:pPr marL="914400" lvl="1" indent="-457200">
+              <a:buAutoNum type="arabicPeriod"/>
+            </a:pPr>
+            <a:endParaRPr lang="en-US" sz="2500" dirty="0"/>
+          </a:p>
+          <a:p>
+            <a:endParaRPr lang="en-US" sz="2500" dirty="0"/>
+          </a:p>
+        </p:txBody>
+      </p:sp>
+    </p:spTree>
+    <p:extLst>
+      <p:ext uri="{BB962C8B-B14F-4D97-AF65-F5344CB8AC3E}">
+        <p14:creationId xmlns:p14="http://schemas.microsoft.com/office/powerpoint/2010/main" val="1712794013"/>
       </p:ext>
     </p:extLst>
   </p:cSld>
@@ -7170,4 +8280,299 @@
     </a:ext>
   </a:extLst>
 </a:theme>
+</file>
+
+<file path=ppt/theme/theme2.xml><?xml version="1.0" encoding="utf-8"?>
+<a:theme xmlns:a="http://schemas.openxmlformats.org/drawingml/2006/main" name="Office Theme">
+  <a:themeElements>
+    <a:clrScheme name="Office">
+      <a:dk1>
+        <a:sysClr val="windowText" lastClr="000000"/>
+      </a:dk1>
+      <a:lt1>
+        <a:sysClr val="window" lastClr="FFFFFF"/>
+      </a:lt1>
+      <a:dk2>
+        <a:srgbClr val="44546A"/>
+      </a:dk2>
+      <a:lt2>
+        <a:srgbClr val="E7E6E6"/>
+      </a:lt2>
+      <a:accent1>
+        <a:srgbClr val="4472C4"/>
+      </a:accent1>
+      <a:accent2>
+        <a:srgbClr val="ED7D31"/>
+      </a:accent2>
+      <a:accent3>
+        <a:srgbClr val="A5A5A5"/>
+      </a:accent3>
+      <a:accent4>
+        <a:srgbClr val="FFC000"/>
+      </a:accent4>
+      <a:accent5>
+        <a:srgbClr val="5B9BD5"/>
+      </a:accent5>
+      <a:accent6>
+        <a:srgbClr val="70AD47"/>
+      </a:accent6>
+      <a:hlink>
+        <a:srgbClr val="0563C1"/>
+      </a:hlink>
+      <a:folHlink>
+        <a:srgbClr val="954F72"/>
+      </a:folHlink>
+    </a:clrScheme>
+    <a:fontScheme name="Office">
+      <a:majorFont>
+        <a:latin typeface="Calibri Light" panose="020F0302020204030204"/>
+        <a:ea typeface=""/>
+        <a:cs typeface=""/>
+        <a:font script="Jpan" typeface="游ゴシック Light"/>
+        <a:font script="Hang" typeface="맑은 고딕"/>
+        <a:font script="Hans" typeface="等线 Light"/>
+        <a:font script="Hant" typeface="新細明體"/>
+        <a:font script="Arab" typeface="Times New Roman"/>
+        <a:font script="Hebr" typeface="Times New Roman"/>
+        <a:font script="Thai" typeface="Angsana New"/>
+        <a:font script="Ethi" typeface="Nyala"/>
+        <a:font script="Beng" typeface="Vrinda"/>
+        <a:font script="Gujr" typeface="Shruti"/>
+        <a:font script="Khmr" typeface="MoolBoran"/>
+        <a:font script="Knda" typeface="Tunga"/>
+        <a:font script="Guru" typeface="Raavi"/>
+        <a:font script="Cans" typeface="Euphemia"/>
+        <a:font script="Cher" typeface="Plantagenet Cherokee"/>
+        <a:font script="Yiii" typeface="Microsoft Yi Baiti"/>
+        <a:font script="Tibt" typeface="Microsoft Himalaya"/>
+        <a:font script="Thaa" typeface="MV Boli"/>
+        <a:font script="Deva" typeface="Mangal"/>
+        <a:font script="Telu" typeface="Gautami"/>
+        <a:font script="Taml" typeface="Latha"/>
+        <a:font script="Syrc" typeface="Estrangelo Edessa"/>
+        <a:font script="Orya" typeface="Kalinga"/>
+        <a:font script="Mlym" typeface="Kartika"/>
+        <a:font script="Laoo" typeface="DokChampa"/>
+        <a:font script="Sinh" typeface="Iskoola Pota"/>
+        <a:font script="Mong" typeface="Mongolian Baiti"/>
+        <a:font script="Viet" typeface="Times New Roman"/>
+        <a:font script="Uigh" typeface="Microsoft Uighur"/>
+        <a:font script="Geor" typeface="Sylfaen"/>
+        <a:font script="Armn" typeface="Arial"/>
+        <a:font script="Bugi" typeface="Leelawadee UI"/>
+        <a:font script="Bopo" typeface="Microsoft JhengHei"/>
+        <a:font script="Java" typeface="Javanese Text"/>
+        <a:font script="Lisu" typeface="Segoe UI"/>
+        <a:font script="Mymr" typeface="Myanmar Text"/>
+        <a:font script="Nkoo" typeface="Ebrima"/>
+        <a:font script="Olck" typeface="Nirmala UI"/>
+        <a:font script="Osma" typeface="Ebrima"/>
+        <a:font script="Phag" typeface="Phagspa"/>
+        <a:font script="Syrn" typeface="Estrangelo Edessa"/>
+        <a:font script="Syrj" typeface="Estrangelo Edessa"/>
+        <a:font script="Syre" typeface="Estrangelo Edessa"/>
+        <a:font script="Sora" typeface="Nirmala UI"/>
+        <a:font script="Tale" typeface="Microsoft Tai Le"/>
+        <a:font script="Talu" typeface="Microsoft New Tai Lue"/>
+        <a:font script="Tfng" typeface="Ebrima"/>
+      </a:majorFont>
+      <a:minorFont>
+        <a:latin typeface="Calibri" panose="020F0502020204030204"/>
+        <a:ea typeface=""/>
+        <a:cs typeface=""/>
+        <a:font script="Jpan" typeface="游ゴシック"/>
+        <a:font script="Hang" typeface="맑은 고딕"/>
+        <a:font script="Hans" typeface="等线"/>
+        <a:font script="Hant" typeface="新細明體"/>
+        <a:font script="Arab" typeface="Arial"/>
+        <a:font script="Hebr" typeface="Arial"/>
+        <a:font script="Thai" typeface="Cordia New"/>
+        <a:font script="Ethi" typeface="Nyala"/>
+        <a:font script="Beng" typeface="Vrinda"/>
+        <a:font script="Gujr" typeface="Shruti"/>
+        <a:font script="Khmr" typeface="DaunPenh"/>
+        <a:font script="Knda" typeface="Tunga"/>
+        <a:font script="Guru" typeface="Raavi"/>
+        <a:font script="Cans" typeface="Euphemia"/>
+        <a:font script="Cher" typeface="Plantagenet Cherokee"/>
+        <a:font script="Yiii" typeface="Microsoft Yi Baiti"/>
+        <a:font script="Tibt" typeface="Microsoft Himalaya"/>
+        <a:font script="Thaa" typeface="MV Boli"/>
+        <a:font script="Deva" typeface="Mangal"/>
+        <a:font script="Telu" typeface="Gautami"/>
+        <a:font script="Taml" typeface="Latha"/>
+        <a:font script="Syrc" typeface="Estrangelo Edessa"/>
+        <a:font script="Orya" typeface="Kalinga"/>
+        <a:font script="Mlym" typeface="Kartika"/>
+        <a:font script="Laoo" typeface="DokChampa"/>
+        <a:font script="Sinh" typeface="Iskoola Pota"/>
+        <a:font script="Mong" typeface="Mongolian Baiti"/>
+        <a:font script="Viet" typeface="Arial"/>
+        <a:font script="Uigh" typeface="Microsoft Uighur"/>
+        <a:font script="Geor" typeface="Sylfaen"/>
+        <a:font script="Armn" typeface="Arial"/>
+        <a:font script="Bugi" typeface="Leelawadee UI"/>
+        <a:font script="Bopo" typeface="Microsoft JhengHei"/>
+        <a:font script="Java" typeface="Javanese Text"/>
+        <a:font script="Lisu" typeface="Segoe UI"/>
+        <a:font script="Mymr" typeface="Myanmar Text"/>
+        <a:font script="Nkoo" typeface="Ebrima"/>
+        <a:font script="Olck" typeface="Nirmala UI"/>
+        <a:font script="Osma" typeface="Ebrima"/>
+        <a:font script="Phag" typeface="Phagspa"/>
+        <a:font script="Syrn" typeface="Estrangelo Edessa"/>
+        <a:font script="Syrj" typeface="Estrangelo Edessa"/>
+        <a:font script="Syre" typeface="Estrangelo Edessa"/>
+        <a:font script="Sora" typeface="Nirmala UI"/>
+        <a:font script="Tale" typeface="Microsoft Tai Le"/>
+        <a:font script="Talu" typeface="Microsoft New Tai Lue"/>
+        <a:font script="Tfng" typeface="Ebrima"/>
+      </a:minorFont>
+    </a:fontScheme>
+    <a:fmtScheme name="Office">
+      <a:fillStyleLst>
+        <a:solidFill>
+          <a:schemeClr val="phClr"/>
+        </a:solidFill>
+        <a:gradFill rotWithShape="1">
+          <a:gsLst>
+            <a:gs pos="0">
+              <a:schemeClr val="phClr">
+                <a:lumMod val="110000"/>
+                <a:satMod val="105000"/>
+                <a:tint val="67000"/>
+              </a:schemeClr>
+            </a:gs>
+            <a:gs pos="50000">
+              <a:schemeClr val="phClr">
+                <a:lumMod val="105000"/>
+                <a:satMod val="103000"/>
+                <a:tint val="73000"/>
+              </a:schemeClr>
+            </a:gs>
+            <a:gs pos="100000">
+              <a:schemeClr val="phClr">
+                <a:lumMod val="105000"/>
+                <a:satMod val="109000"/>
+                <a:tint val="81000"/>
+              </a:schemeClr>
+            </a:gs>
+          </a:gsLst>
+          <a:lin ang="5400000" scaled="0"/>
+        </a:gradFill>
+        <a:gradFill rotWithShape="1">
+          <a:gsLst>
+            <a:gs pos="0">
+              <a:schemeClr val="phClr">
+                <a:satMod val="103000"/>
+                <a:lumMod val="102000"/>
+                <a:tint val="94000"/>
+              </a:schemeClr>
+            </a:gs>
+            <a:gs pos="50000">
+              <a:schemeClr val="phClr">
+                <a:satMod val="110000"/>
+                <a:lumMod val="100000"/>
+                <a:shade val="100000"/>
+              </a:schemeClr>
+            </a:gs>
+            <a:gs pos="100000">
+              <a:schemeClr val="phClr">
+                <a:lumMod val="99000"/>
+                <a:satMod val="120000"/>
+                <a:shade val="78000"/>
+              </a:schemeClr>
+            </a:gs>
+          </a:gsLst>
+          <a:lin ang="5400000" scaled="0"/>
+        </a:gradFill>
+      </a:fillStyleLst>
+      <a:lnStyleLst>
+        <a:ln w="6350" cap="flat" cmpd="sng" algn="ctr">
+          <a:solidFill>
+            <a:schemeClr val="phClr"/>
+          </a:solidFill>
+          <a:prstDash val="solid"/>
+          <a:miter lim="800000"/>
+        </a:ln>
+        <a:ln w="12700" cap="flat" cmpd="sng" algn="ctr">
+          <a:solidFill>
+            <a:schemeClr val="phClr"/>
+          </a:solidFill>
+          <a:prstDash val="solid"/>
+          <a:miter lim="800000"/>
+        </a:ln>
+        <a:ln w="19050" cap="flat" cmpd="sng" algn="ctr">
+          <a:solidFill>
+            <a:schemeClr val="phClr"/>
+          </a:solidFill>
+          <a:prstDash val="solid"/>
+          <a:miter lim="800000"/>
+        </a:ln>
+      </a:lnStyleLst>
+      <a:effectStyleLst>
+        <a:effectStyle>
+          <a:effectLst/>
+        </a:effectStyle>
+        <a:effectStyle>
+          <a:effectLst/>
+        </a:effectStyle>
+        <a:effectStyle>
+          <a:effectLst>
+            <a:outerShdw blurRad="57150" dist="19050" dir="5400000" algn="ctr" rotWithShape="0">
+              <a:srgbClr val="000000">
+                <a:alpha val="63000"/>
+              </a:srgbClr>
+            </a:outerShdw>
+          </a:effectLst>
+        </a:effectStyle>
+      </a:effectStyleLst>
+      <a:bgFillStyleLst>
+        <a:solidFill>
+          <a:schemeClr val="phClr"/>
+        </a:solidFill>
+        <a:solidFill>
+          <a:schemeClr val="phClr">
+            <a:tint val="95000"/>
+            <a:satMod val="170000"/>
+          </a:schemeClr>
+        </a:solidFill>
+        <a:gradFill rotWithShape="1">
+          <a:gsLst>
+            <a:gs pos="0">
+              <a:schemeClr val="phClr">
+                <a:tint val="93000"/>
+                <a:satMod val="150000"/>
+                <a:shade val="98000"/>
+                <a:lumMod val="102000"/>
+              </a:schemeClr>
+            </a:gs>
+            <a:gs pos="50000">
+              <a:schemeClr val="phClr">
+                <a:tint val="98000"/>
+                <a:satMod val="130000"/>
+                <a:shade val="90000"/>
+                <a:lumMod val="103000"/>
+              </a:schemeClr>
+            </a:gs>
+            <a:gs pos="100000">
+              <a:schemeClr val="phClr">
+                <a:shade val="63000"/>
+                <a:satMod val="120000"/>
+              </a:schemeClr>
+            </a:gs>
+          </a:gsLst>
+          <a:lin ang="5400000" scaled="0"/>
+        </a:gradFill>
+      </a:bgFillStyleLst>
+    </a:fmtScheme>
+  </a:themeElements>
+  <a:objectDefaults/>
+  <a:extraClrSchemeLst/>
+  <a:extLst>
+    <a:ext uri="{05A4C25C-085E-4340-85A3-A5531E510DB2}">
+      <thm15:themeFamily xmlns:thm15="http://schemas.microsoft.com/office/thememl/2012/main" name="Office Theme" id="{62F939B6-93AF-4DB8-9C6B-D6C7DFDC589F}" vid="{4A3C46E8-61CC-4603-A589-7422A47A8E4A}"/>
+    </a:ext>
+  </a:extLst>
+</a:theme>
 </file>
</xml_diff>